<commit_message>
apresentacao final do projeto integrador
</commit_message>
<xml_diff>
--- a/Projeto Integrador - Apresentação.pptx
+++ b/Projeto Integrador - Apresentação.pptx
@@ -2,10 +2,10 @@
 <file path=ppt/presentation.xml><?xml version="1.0" encoding="utf-8"?>
 <p:presentation xmlns:a="http://schemas.openxmlformats.org/drawingml/2006/main" xmlns:r="http://schemas.openxmlformats.org/officeDocument/2006/relationships" xmlns:p="http://schemas.openxmlformats.org/presentationml/2006/main" saveSubsetFonts="1">
   <p:sldMasterIdLst>
-    <p:sldMasterId id="2147483648" r:id="rId1"/>
+    <p:sldMasterId id="2147483886" r:id="rId1"/>
   </p:sldMasterIdLst>
   <p:sldIdLst>
-    <p:sldId id="256" r:id="rId2"/>
+    <p:sldId id="266" r:id="rId2"/>
     <p:sldId id="257" r:id="rId3"/>
     <p:sldId id="258" r:id="rId4"/>
     <p:sldId id="259" r:id="rId5"/>
@@ -138,7 +138,7 @@
           <p:cNvPr id="2" name="Título 1">
             <a:extLst>
               <a:ext uri="{FF2B5EF4-FFF2-40B4-BE49-F238E27FC236}">
-                <a16:creationId xmlns:a16="http://schemas.microsoft.com/office/drawing/2014/main" id="{92532688-013E-41D3-A2C3-AC57E9E62B60}"/>
+                <a16:creationId xmlns:a16="http://schemas.microsoft.com/office/drawing/2014/main" id="{C72D440A-0B59-4F72-8C78-9C76F6654053}"/>
               </a:ext>
             </a:extLst>
           </p:cNvPr>
@@ -175,7 +175,7 @@
           <p:cNvPr id="3" name="Subtítulo 2">
             <a:extLst>
               <a:ext uri="{FF2B5EF4-FFF2-40B4-BE49-F238E27FC236}">
-                <a16:creationId xmlns:a16="http://schemas.microsoft.com/office/drawing/2014/main" id="{9FF6E769-79AC-4DAB-ADFE-0A6DC28E6485}"/>
+                <a16:creationId xmlns:a16="http://schemas.microsoft.com/office/drawing/2014/main" id="{ACAF8AB2-0DA3-40F2-B722-F0648A23F669}"/>
               </a:ext>
             </a:extLst>
           </p:cNvPr>
@@ -245,7 +245,7 @@
           <p:cNvPr id="4" name="Espaço Reservado para Data 3">
             <a:extLst>
               <a:ext uri="{FF2B5EF4-FFF2-40B4-BE49-F238E27FC236}">
-                <a16:creationId xmlns:a16="http://schemas.microsoft.com/office/drawing/2014/main" id="{C0122C77-F254-44A4-9F9F-DEA759571E29}"/>
+                <a16:creationId xmlns:a16="http://schemas.microsoft.com/office/drawing/2014/main" id="{28BD3CD4-9530-4568-91CB-BAC4999D5CAA}"/>
               </a:ext>
             </a:extLst>
           </p:cNvPr>
@@ -263,7 +263,7 @@
           <a:p>
             <a:fld id="{0CB0AD37-FD0E-4325-A8C1-3F6096B2803B}" type="datetimeFigureOut">
               <a:rPr lang="pt-BR" smtClean="0"/>
-              <a:t>14/11/2020</a:t>
+              <a:t>23/11/2020</a:t>
             </a:fld>
             <a:endParaRPr lang="pt-BR"/>
           </a:p>
@@ -274,7 +274,7 @@
           <p:cNvPr id="5" name="Espaço Reservado para Rodapé 4">
             <a:extLst>
               <a:ext uri="{FF2B5EF4-FFF2-40B4-BE49-F238E27FC236}">
-                <a16:creationId xmlns:a16="http://schemas.microsoft.com/office/drawing/2014/main" id="{EF19BD89-4E1F-4F7D-8CD9-B3A999EF4E73}"/>
+                <a16:creationId xmlns:a16="http://schemas.microsoft.com/office/drawing/2014/main" id="{B4D89A5C-825B-4BA3-9BE4-671CD0760898}"/>
               </a:ext>
             </a:extLst>
           </p:cNvPr>
@@ -299,7 +299,7 @@
           <p:cNvPr id="6" name="Espaço Reservado para Número de Slide 5">
             <a:extLst>
               <a:ext uri="{FF2B5EF4-FFF2-40B4-BE49-F238E27FC236}">
-                <a16:creationId xmlns:a16="http://schemas.microsoft.com/office/drawing/2014/main" id="{DDDE5D82-8B91-47CE-8BBB-0EC906AAD29F}"/>
+                <a16:creationId xmlns:a16="http://schemas.microsoft.com/office/drawing/2014/main" id="{D5B7079C-D194-4BAF-962D-2421987C5341}"/>
               </a:ext>
             </a:extLst>
           </p:cNvPr>
@@ -326,7 +326,7 @@
     </p:spTree>
     <p:extLst>
       <p:ext uri="{BB962C8B-B14F-4D97-AF65-F5344CB8AC3E}">
-        <p14:creationId xmlns:p14="http://schemas.microsoft.com/office/powerpoint/2010/main" val="1925896019"/>
+        <p14:creationId xmlns:p14="http://schemas.microsoft.com/office/powerpoint/2010/main" val="3776225357"/>
       </p:ext>
     </p:extLst>
   </p:cSld>
@@ -358,7 +358,7 @@
           <p:cNvPr id="2" name="Título 1">
             <a:extLst>
               <a:ext uri="{FF2B5EF4-FFF2-40B4-BE49-F238E27FC236}">
-                <a16:creationId xmlns:a16="http://schemas.microsoft.com/office/drawing/2014/main" id="{C4E2F998-CBF7-460F-8530-021ED644328C}"/>
+                <a16:creationId xmlns:a16="http://schemas.microsoft.com/office/drawing/2014/main" id="{DCDACCBC-1E5E-4C09-97CB-CF36442CF033}"/>
               </a:ext>
             </a:extLst>
           </p:cNvPr>
@@ -386,7 +386,7 @@
           <p:cNvPr id="3" name="Espaço Reservado para Texto Vertical 2">
             <a:extLst>
               <a:ext uri="{FF2B5EF4-FFF2-40B4-BE49-F238E27FC236}">
-                <a16:creationId xmlns:a16="http://schemas.microsoft.com/office/drawing/2014/main" id="{E86B94C5-0752-4EC4-BEF7-5DEE2FAB28B1}"/>
+                <a16:creationId xmlns:a16="http://schemas.microsoft.com/office/drawing/2014/main" id="{49285AFC-30F2-4790-A128-99F9B6DAB0A8}"/>
               </a:ext>
             </a:extLst>
           </p:cNvPr>
@@ -443,7 +443,7 @@
           <p:cNvPr id="4" name="Espaço Reservado para Data 3">
             <a:extLst>
               <a:ext uri="{FF2B5EF4-FFF2-40B4-BE49-F238E27FC236}">
-                <a16:creationId xmlns:a16="http://schemas.microsoft.com/office/drawing/2014/main" id="{096E4393-FA4D-4FB7-BB81-977778EF9EDD}"/>
+                <a16:creationId xmlns:a16="http://schemas.microsoft.com/office/drawing/2014/main" id="{4E62B2AC-4A53-433A-833C-219C728ABB90}"/>
               </a:ext>
             </a:extLst>
           </p:cNvPr>
@@ -461,7 +461,7 @@
           <a:p>
             <a:fld id="{0CB0AD37-FD0E-4325-A8C1-3F6096B2803B}" type="datetimeFigureOut">
               <a:rPr lang="pt-BR" smtClean="0"/>
-              <a:t>14/11/2020</a:t>
+              <a:t>23/11/2020</a:t>
             </a:fld>
             <a:endParaRPr lang="pt-BR"/>
           </a:p>
@@ -472,7 +472,7 @@
           <p:cNvPr id="5" name="Espaço Reservado para Rodapé 4">
             <a:extLst>
               <a:ext uri="{FF2B5EF4-FFF2-40B4-BE49-F238E27FC236}">
-                <a16:creationId xmlns:a16="http://schemas.microsoft.com/office/drawing/2014/main" id="{5CB2C962-3023-4A5A-8A15-F5BD36EDEFCB}"/>
+                <a16:creationId xmlns:a16="http://schemas.microsoft.com/office/drawing/2014/main" id="{8585AF97-2DEA-4381-A0CA-1A828B7F1B7E}"/>
               </a:ext>
             </a:extLst>
           </p:cNvPr>
@@ -497,7 +497,7 @@
           <p:cNvPr id="6" name="Espaço Reservado para Número de Slide 5">
             <a:extLst>
               <a:ext uri="{FF2B5EF4-FFF2-40B4-BE49-F238E27FC236}">
-                <a16:creationId xmlns:a16="http://schemas.microsoft.com/office/drawing/2014/main" id="{2F8CB235-9DC2-4D16-94C0-6FD5C6ED3A70}"/>
+                <a16:creationId xmlns:a16="http://schemas.microsoft.com/office/drawing/2014/main" id="{28E9BDDB-8C44-4EEA-B7C2-ABEA4D637DA3}"/>
               </a:ext>
             </a:extLst>
           </p:cNvPr>
@@ -524,7 +524,7 @@
     </p:spTree>
     <p:extLst>
       <p:ext uri="{BB962C8B-B14F-4D97-AF65-F5344CB8AC3E}">
-        <p14:creationId xmlns:p14="http://schemas.microsoft.com/office/powerpoint/2010/main" val="4050938386"/>
+        <p14:creationId xmlns:p14="http://schemas.microsoft.com/office/powerpoint/2010/main" val="3187628008"/>
       </p:ext>
     </p:extLst>
   </p:cSld>
@@ -556,7 +556,7 @@
           <p:cNvPr id="2" name="Título Vertical 1">
             <a:extLst>
               <a:ext uri="{FF2B5EF4-FFF2-40B4-BE49-F238E27FC236}">
-                <a16:creationId xmlns:a16="http://schemas.microsoft.com/office/drawing/2014/main" id="{1ABE0744-A4EB-42FF-A732-B3572BAA3C09}"/>
+                <a16:creationId xmlns:a16="http://schemas.microsoft.com/office/drawing/2014/main" id="{F4C8BF46-5C2A-4B34-9F3A-9D5D71F55E6B}"/>
               </a:ext>
             </a:extLst>
           </p:cNvPr>
@@ -589,7 +589,7 @@
           <p:cNvPr id="3" name="Espaço Reservado para Texto Vertical 2">
             <a:extLst>
               <a:ext uri="{FF2B5EF4-FFF2-40B4-BE49-F238E27FC236}">
-                <a16:creationId xmlns:a16="http://schemas.microsoft.com/office/drawing/2014/main" id="{5E5C24DC-EB09-4F86-90A2-1DC261074E59}"/>
+                <a16:creationId xmlns:a16="http://schemas.microsoft.com/office/drawing/2014/main" id="{6DC5AF54-0E8D-45CF-B18D-14733DD81277}"/>
               </a:ext>
             </a:extLst>
           </p:cNvPr>
@@ -651,7 +651,7 @@
           <p:cNvPr id="4" name="Espaço Reservado para Data 3">
             <a:extLst>
               <a:ext uri="{FF2B5EF4-FFF2-40B4-BE49-F238E27FC236}">
-                <a16:creationId xmlns:a16="http://schemas.microsoft.com/office/drawing/2014/main" id="{16A84A65-6777-4550-B287-095EA526CD28}"/>
+                <a16:creationId xmlns:a16="http://schemas.microsoft.com/office/drawing/2014/main" id="{E6355AD0-0EEF-4F20-8DF6-62DB5297BF61}"/>
               </a:ext>
             </a:extLst>
           </p:cNvPr>
@@ -669,7 +669,7 @@
           <a:p>
             <a:fld id="{0CB0AD37-FD0E-4325-A8C1-3F6096B2803B}" type="datetimeFigureOut">
               <a:rPr lang="pt-BR" smtClean="0"/>
-              <a:t>14/11/2020</a:t>
+              <a:t>23/11/2020</a:t>
             </a:fld>
             <a:endParaRPr lang="pt-BR"/>
           </a:p>
@@ -680,7 +680,7 @@
           <p:cNvPr id="5" name="Espaço Reservado para Rodapé 4">
             <a:extLst>
               <a:ext uri="{FF2B5EF4-FFF2-40B4-BE49-F238E27FC236}">
-                <a16:creationId xmlns:a16="http://schemas.microsoft.com/office/drawing/2014/main" id="{DADF6586-4FAB-425E-804A-0439B066D424}"/>
+                <a16:creationId xmlns:a16="http://schemas.microsoft.com/office/drawing/2014/main" id="{83A39DAA-64A8-4471-9A63-E8C606A52F25}"/>
               </a:ext>
             </a:extLst>
           </p:cNvPr>
@@ -705,7 +705,7 @@
           <p:cNvPr id="6" name="Espaço Reservado para Número de Slide 5">
             <a:extLst>
               <a:ext uri="{FF2B5EF4-FFF2-40B4-BE49-F238E27FC236}">
-                <a16:creationId xmlns:a16="http://schemas.microsoft.com/office/drawing/2014/main" id="{33A46311-B56A-4AA0-93A6-32CC7CCC96C1}"/>
+                <a16:creationId xmlns:a16="http://schemas.microsoft.com/office/drawing/2014/main" id="{CEFBAB9D-0BD5-4912-BF8E-EF50B1C2B679}"/>
               </a:ext>
             </a:extLst>
           </p:cNvPr>
@@ -732,7 +732,7 @@
     </p:spTree>
     <p:extLst>
       <p:ext uri="{BB962C8B-B14F-4D97-AF65-F5344CB8AC3E}">
-        <p14:creationId xmlns:p14="http://schemas.microsoft.com/office/powerpoint/2010/main" val="3437360526"/>
+        <p14:creationId xmlns:p14="http://schemas.microsoft.com/office/powerpoint/2010/main" val="86335278"/>
       </p:ext>
     </p:extLst>
   </p:cSld>
@@ -764,7 +764,7 @@
           <p:cNvPr id="2" name="Título 1">
             <a:extLst>
               <a:ext uri="{FF2B5EF4-FFF2-40B4-BE49-F238E27FC236}">
-                <a16:creationId xmlns:a16="http://schemas.microsoft.com/office/drawing/2014/main" id="{53C538B4-BAF9-4764-B840-4AF6E5ACD626}"/>
+                <a16:creationId xmlns:a16="http://schemas.microsoft.com/office/drawing/2014/main" id="{4C8BB159-117A-4B38-957E-1D108AE875FA}"/>
               </a:ext>
             </a:extLst>
           </p:cNvPr>
@@ -792,7 +792,7 @@
           <p:cNvPr id="3" name="Espaço Reservado para Conteúdo 2">
             <a:extLst>
               <a:ext uri="{FF2B5EF4-FFF2-40B4-BE49-F238E27FC236}">
-                <a16:creationId xmlns:a16="http://schemas.microsoft.com/office/drawing/2014/main" id="{1534BE04-AC94-4378-ABDE-15B5752C13C2}"/>
+                <a16:creationId xmlns:a16="http://schemas.microsoft.com/office/drawing/2014/main" id="{919C69FD-FC39-4033-A677-0731035DEE93}"/>
               </a:ext>
             </a:extLst>
           </p:cNvPr>
@@ -849,7 +849,7 @@
           <p:cNvPr id="4" name="Espaço Reservado para Data 3">
             <a:extLst>
               <a:ext uri="{FF2B5EF4-FFF2-40B4-BE49-F238E27FC236}">
-                <a16:creationId xmlns:a16="http://schemas.microsoft.com/office/drawing/2014/main" id="{1303387F-8E9D-4F7A-928E-3683AB55542F}"/>
+                <a16:creationId xmlns:a16="http://schemas.microsoft.com/office/drawing/2014/main" id="{E1D72ED4-1326-4625-ADAE-A264BCCE11D8}"/>
               </a:ext>
             </a:extLst>
           </p:cNvPr>
@@ -867,7 +867,7 @@
           <a:p>
             <a:fld id="{0CB0AD37-FD0E-4325-A8C1-3F6096B2803B}" type="datetimeFigureOut">
               <a:rPr lang="pt-BR" smtClean="0"/>
-              <a:t>14/11/2020</a:t>
+              <a:t>23/11/2020</a:t>
             </a:fld>
             <a:endParaRPr lang="pt-BR"/>
           </a:p>
@@ -878,7 +878,7 @@
           <p:cNvPr id="5" name="Espaço Reservado para Rodapé 4">
             <a:extLst>
               <a:ext uri="{FF2B5EF4-FFF2-40B4-BE49-F238E27FC236}">
-                <a16:creationId xmlns:a16="http://schemas.microsoft.com/office/drawing/2014/main" id="{A624B5D2-86B7-4E22-A9E2-C26E3145F164}"/>
+                <a16:creationId xmlns:a16="http://schemas.microsoft.com/office/drawing/2014/main" id="{34C22C59-3C4F-4357-8677-61166054FF03}"/>
               </a:ext>
             </a:extLst>
           </p:cNvPr>
@@ -903,7 +903,7 @@
           <p:cNvPr id="6" name="Espaço Reservado para Número de Slide 5">
             <a:extLst>
               <a:ext uri="{FF2B5EF4-FFF2-40B4-BE49-F238E27FC236}">
-                <a16:creationId xmlns:a16="http://schemas.microsoft.com/office/drawing/2014/main" id="{49F526D1-EFC2-4D8E-A35A-D813555FC5A9}"/>
+                <a16:creationId xmlns:a16="http://schemas.microsoft.com/office/drawing/2014/main" id="{D3FF6D8D-26DC-470A-BDF1-9E6525AB076E}"/>
               </a:ext>
             </a:extLst>
           </p:cNvPr>
@@ -930,7 +930,7 @@
     </p:spTree>
     <p:extLst>
       <p:ext uri="{BB962C8B-B14F-4D97-AF65-F5344CB8AC3E}">
-        <p14:creationId xmlns:p14="http://schemas.microsoft.com/office/powerpoint/2010/main" val="1922278210"/>
+        <p14:creationId xmlns:p14="http://schemas.microsoft.com/office/powerpoint/2010/main" val="1861216411"/>
       </p:ext>
     </p:extLst>
   </p:cSld>
@@ -962,7 +962,7 @@
           <p:cNvPr id="2" name="Título 1">
             <a:extLst>
               <a:ext uri="{FF2B5EF4-FFF2-40B4-BE49-F238E27FC236}">
-                <a16:creationId xmlns:a16="http://schemas.microsoft.com/office/drawing/2014/main" id="{D1EDE9DC-0D35-40E9-BAE4-438DB9CF0B4A}"/>
+                <a16:creationId xmlns:a16="http://schemas.microsoft.com/office/drawing/2014/main" id="{8CC63C9E-8D8D-4D40-8EEF-FB64C2B769B6}"/>
               </a:ext>
             </a:extLst>
           </p:cNvPr>
@@ -999,7 +999,7 @@
           <p:cNvPr id="3" name="Espaço Reservado para Texto 2">
             <a:extLst>
               <a:ext uri="{FF2B5EF4-FFF2-40B4-BE49-F238E27FC236}">
-                <a16:creationId xmlns:a16="http://schemas.microsoft.com/office/drawing/2014/main" id="{E211C538-4D93-4E43-A601-8E8869A0572C}"/>
+                <a16:creationId xmlns:a16="http://schemas.microsoft.com/office/drawing/2014/main" id="{EBD96191-9C98-47FB-A375-D4C3E3D7C996}"/>
               </a:ext>
             </a:extLst>
           </p:cNvPr>
@@ -1124,7 +1124,7 @@
           <p:cNvPr id="4" name="Espaço Reservado para Data 3">
             <a:extLst>
               <a:ext uri="{FF2B5EF4-FFF2-40B4-BE49-F238E27FC236}">
-                <a16:creationId xmlns:a16="http://schemas.microsoft.com/office/drawing/2014/main" id="{6363EBAF-7B20-47C4-A47F-4F124F993FAD}"/>
+                <a16:creationId xmlns:a16="http://schemas.microsoft.com/office/drawing/2014/main" id="{F8843B99-E725-4044-A66E-CF2DF8B4B98D}"/>
               </a:ext>
             </a:extLst>
           </p:cNvPr>
@@ -1142,7 +1142,7 @@
           <a:p>
             <a:fld id="{0CB0AD37-FD0E-4325-A8C1-3F6096B2803B}" type="datetimeFigureOut">
               <a:rPr lang="pt-BR" smtClean="0"/>
-              <a:t>14/11/2020</a:t>
+              <a:t>23/11/2020</a:t>
             </a:fld>
             <a:endParaRPr lang="pt-BR"/>
           </a:p>
@@ -1153,7 +1153,7 @@
           <p:cNvPr id="5" name="Espaço Reservado para Rodapé 4">
             <a:extLst>
               <a:ext uri="{FF2B5EF4-FFF2-40B4-BE49-F238E27FC236}">
-                <a16:creationId xmlns:a16="http://schemas.microsoft.com/office/drawing/2014/main" id="{27C0B1CF-D47C-4211-854C-CAA93D786D17}"/>
+                <a16:creationId xmlns:a16="http://schemas.microsoft.com/office/drawing/2014/main" id="{D5D2BA3E-9DCB-41F9-A074-A53C79312B0C}"/>
               </a:ext>
             </a:extLst>
           </p:cNvPr>
@@ -1178,7 +1178,7 @@
           <p:cNvPr id="6" name="Espaço Reservado para Número de Slide 5">
             <a:extLst>
               <a:ext uri="{FF2B5EF4-FFF2-40B4-BE49-F238E27FC236}">
-                <a16:creationId xmlns:a16="http://schemas.microsoft.com/office/drawing/2014/main" id="{87A63AB0-A634-4417-83F2-A03D80F18E38}"/>
+                <a16:creationId xmlns:a16="http://schemas.microsoft.com/office/drawing/2014/main" id="{29D5CC03-2E8B-438F-906E-CC0A44726862}"/>
               </a:ext>
             </a:extLst>
           </p:cNvPr>
@@ -1205,7 +1205,7 @@
     </p:spTree>
     <p:extLst>
       <p:ext uri="{BB962C8B-B14F-4D97-AF65-F5344CB8AC3E}">
-        <p14:creationId xmlns:p14="http://schemas.microsoft.com/office/powerpoint/2010/main" val="428165663"/>
+        <p14:creationId xmlns:p14="http://schemas.microsoft.com/office/powerpoint/2010/main" val="313382037"/>
       </p:ext>
     </p:extLst>
   </p:cSld>
@@ -1237,7 +1237,7 @@
           <p:cNvPr id="2" name="Título 1">
             <a:extLst>
               <a:ext uri="{FF2B5EF4-FFF2-40B4-BE49-F238E27FC236}">
-                <a16:creationId xmlns:a16="http://schemas.microsoft.com/office/drawing/2014/main" id="{0C282A0E-618A-48E5-8BE4-624DC1731E7F}"/>
+                <a16:creationId xmlns:a16="http://schemas.microsoft.com/office/drawing/2014/main" id="{5EA8A38A-4386-4A88-8F37-79364103FA8A}"/>
               </a:ext>
             </a:extLst>
           </p:cNvPr>
@@ -1265,7 +1265,7 @@
           <p:cNvPr id="3" name="Espaço Reservado para Conteúdo 2">
             <a:extLst>
               <a:ext uri="{FF2B5EF4-FFF2-40B4-BE49-F238E27FC236}">
-                <a16:creationId xmlns:a16="http://schemas.microsoft.com/office/drawing/2014/main" id="{BB6934D1-7173-4B83-A3FA-95B72CF7BE98}"/>
+                <a16:creationId xmlns:a16="http://schemas.microsoft.com/office/drawing/2014/main" id="{471F8050-D441-4603-89DD-7BF24299AF9A}"/>
               </a:ext>
             </a:extLst>
           </p:cNvPr>
@@ -1327,7 +1327,7 @@
           <p:cNvPr id="4" name="Espaço Reservado para Conteúdo 3">
             <a:extLst>
               <a:ext uri="{FF2B5EF4-FFF2-40B4-BE49-F238E27FC236}">
-                <a16:creationId xmlns:a16="http://schemas.microsoft.com/office/drawing/2014/main" id="{E9E3807A-52EE-4924-9B55-C09DBE55F310}"/>
+                <a16:creationId xmlns:a16="http://schemas.microsoft.com/office/drawing/2014/main" id="{D62F34C4-3179-40E6-A37D-A1B1E414C067}"/>
               </a:ext>
             </a:extLst>
           </p:cNvPr>
@@ -1389,7 +1389,7 @@
           <p:cNvPr id="5" name="Espaço Reservado para Data 4">
             <a:extLst>
               <a:ext uri="{FF2B5EF4-FFF2-40B4-BE49-F238E27FC236}">
-                <a16:creationId xmlns:a16="http://schemas.microsoft.com/office/drawing/2014/main" id="{EC36157F-77FE-4506-94C1-738126C1A9B3}"/>
+                <a16:creationId xmlns:a16="http://schemas.microsoft.com/office/drawing/2014/main" id="{20CFC852-B675-4E30-9FAF-550555B5D7D1}"/>
               </a:ext>
             </a:extLst>
           </p:cNvPr>
@@ -1407,7 +1407,7 @@
           <a:p>
             <a:fld id="{0CB0AD37-FD0E-4325-A8C1-3F6096B2803B}" type="datetimeFigureOut">
               <a:rPr lang="pt-BR" smtClean="0"/>
-              <a:t>14/11/2020</a:t>
+              <a:t>23/11/2020</a:t>
             </a:fld>
             <a:endParaRPr lang="pt-BR"/>
           </a:p>
@@ -1418,7 +1418,7 @@
           <p:cNvPr id="6" name="Espaço Reservado para Rodapé 5">
             <a:extLst>
               <a:ext uri="{FF2B5EF4-FFF2-40B4-BE49-F238E27FC236}">
-                <a16:creationId xmlns:a16="http://schemas.microsoft.com/office/drawing/2014/main" id="{2AF76D62-5192-4956-BD7E-485AFA5E23FB}"/>
+                <a16:creationId xmlns:a16="http://schemas.microsoft.com/office/drawing/2014/main" id="{AFD0B739-DE28-40FD-9BDC-D5B4F09325A7}"/>
               </a:ext>
             </a:extLst>
           </p:cNvPr>
@@ -1443,7 +1443,7 @@
           <p:cNvPr id="7" name="Espaço Reservado para Número de Slide 6">
             <a:extLst>
               <a:ext uri="{FF2B5EF4-FFF2-40B4-BE49-F238E27FC236}">
-                <a16:creationId xmlns:a16="http://schemas.microsoft.com/office/drawing/2014/main" id="{852E9446-DC19-4629-8D1C-81D4E2E01982}"/>
+                <a16:creationId xmlns:a16="http://schemas.microsoft.com/office/drawing/2014/main" id="{8664D99E-401F-44D0-9F1C-BD0245FA8B28}"/>
               </a:ext>
             </a:extLst>
           </p:cNvPr>
@@ -1470,7 +1470,7 @@
     </p:spTree>
     <p:extLst>
       <p:ext uri="{BB962C8B-B14F-4D97-AF65-F5344CB8AC3E}">
-        <p14:creationId xmlns:p14="http://schemas.microsoft.com/office/powerpoint/2010/main" val="2625411438"/>
+        <p14:creationId xmlns:p14="http://schemas.microsoft.com/office/powerpoint/2010/main" val="1270791791"/>
       </p:ext>
     </p:extLst>
   </p:cSld>
@@ -1502,7 +1502,7 @@
           <p:cNvPr id="2" name="Título 1">
             <a:extLst>
               <a:ext uri="{FF2B5EF4-FFF2-40B4-BE49-F238E27FC236}">
-                <a16:creationId xmlns:a16="http://schemas.microsoft.com/office/drawing/2014/main" id="{B24E94D4-9CD3-411D-B2EA-D4BE729BE801}"/>
+                <a16:creationId xmlns:a16="http://schemas.microsoft.com/office/drawing/2014/main" id="{AAF8E30C-0D9B-4E44-9233-E369A87A49FE}"/>
               </a:ext>
             </a:extLst>
           </p:cNvPr>
@@ -1535,7 +1535,7 @@
           <p:cNvPr id="3" name="Espaço Reservado para Texto 2">
             <a:extLst>
               <a:ext uri="{FF2B5EF4-FFF2-40B4-BE49-F238E27FC236}">
-                <a16:creationId xmlns:a16="http://schemas.microsoft.com/office/drawing/2014/main" id="{5E8F1B49-2F82-4CCC-8849-D0B4AEF432A2}"/>
+                <a16:creationId xmlns:a16="http://schemas.microsoft.com/office/drawing/2014/main" id="{F737CCE8-066A-4DF8-A4D5-0CDC2E717A19}"/>
               </a:ext>
             </a:extLst>
           </p:cNvPr>
@@ -1606,7 +1606,7 @@
           <p:cNvPr id="4" name="Espaço Reservado para Conteúdo 3">
             <a:extLst>
               <a:ext uri="{FF2B5EF4-FFF2-40B4-BE49-F238E27FC236}">
-                <a16:creationId xmlns:a16="http://schemas.microsoft.com/office/drawing/2014/main" id="{DC1C964E-5A88-4C29-B72A-600D830A4DA2}"/>
+                <a16:creationId xmlns:a16="http://schemas.microsoft.com/office/drawing/2014/main" id="{845999F3-D2F7-43D5-B3EF-5D63D230764F}"/>
               </a:ext>
             </a:extLst>
           </p:cNvPr>
@@ -1668,7 +1668,7 @@
           <p:cNvPr id="5" name="Espaço Reservado para Texto 4">
             <a:extLst>
               <a:ext uri="{FF2B5EF4-FFF2-40B4-BE49-F238E27FC236}">
-                <a16:creationId xmlns:a16="http://schemas.microsoft.com/office/drawing/2014/main" id="{5488663E-3D20-4ECB-9E9E-ECF6F2540D8D}"/>
+                <a16:creationId xmlns:a16="http://schemas.microsoft.com/office/drawing/2014/main" id="{AE788D60-EC47-4801-9E0A-E4D8620CCC59}"/>
               </a:ext>
             </a:extLst>
           </p:cNvPr>
@@ -1739,7 +1739,7 @@
           <p:cNvPr id="6" name="Espaço Reservado para Conteúdo 5">
             <a:extLst>
               <a:ext uri="{FF2B5EF4-FFF2-40B4-BE49-F238E27FC236}">
-                <a16:creationId xmlns:a16="http://schemas.microsoft.com/office/drawing/2014/main" id="{FDBFF60D-0033-4043-A79C-D80887FA850C}"/>
+                <a16:creationId xmlns:a16="http://schemas.microsoft.com/office/drawing/2014/main" id="{96E90769-10A9-4B16-B02A-97996DD1B8C8}"/>
               </a:ext>
             </a:extLst>
           </p:cNvPr>
@@ -1801,7 +1801,7 @@
           <p:cNvPr id="7" name="Espaço Reservado para Data 6">
             <a:extLst>
               <a:ext uri="{FF2B5EF4-FFF2-40B4-BE49-F238E27FC236}">
-                <a16:creationId xmlns:a16="http://schemas.microsoft.com/office/drawing/2014/main" id="{81374E78-D1AB-42B6-AE0E-E52BDD670B21}"/>
+                <a16:creationId xmlns:a16="http://schemas.microsoft.com/office/drawing/2014/main" id="{9F244207-209F-44D7-AF3A-51A54F241AEF}"/>
               </a:ext>
             </a:extLst>
           </p:cNvPr>
@@ -1819,7 +1819,7 @@
           <a:p>
             <a:fld id="{0CB0AD37-FD0E-4325-A8C1-3F6096B2803B}" type="datetimeFigureOut">
               <a:rPr lang="pt-BR" smtClean="0"/>
-              <a:t>14/11/2020</a:t>
+              <a:t>23/11/2020</a:t>
             </a:fld>
             <a:endParaRPr lang="pt-BR"/>
           </a:p>
@@ -1830,7 +1830,7 @@
           <p:cNvPr id="8" name="Espaço Reservado para Rodapé 7">
             <a:extLst>
               <a:ext uri="{FF2B5EF4-FFF2-40B4-BE49-F238E27FC236}">
-                <a16:creationId xmlns:a16="http://schemas.microsoft.com/office/drawing/2014/main" id="{22B645F9-AA72-4AEB-AC87-C3761231A238}"/>
+                <a16:creationId xmlns:a16="http://schemas.microsoft.com/office/drawing/2014/main" id="{392B0502-5472-4014-B9B7-0FE26AE41126}"/>
               </a:ext>
             </a:extLst>
           </p:cNvPr>
@@ -1855,7 +1855,7 @@
           <p:cNvPr id="9" name="Espaço Reservado para Número de Slide 8">
             <a:extLst>
               <a:ext uri="{FF2B5EF4-FFF2-40B4-BE49-F238E27FC236}">
-                <a16:creationId xmlns:a16="http://schemas.microsoft.com/office/drawing/2014/main" id="{7AF631FB-D793-4A0B-A111-7D0EBC5079ED}"/>
+                <a16:creationId xmlns:a16="http://schemas.microsoft.com/office/drawing/2014/main" id="{F63969C4-DCE4-4CCC-91CE-560C17982DCE}"/>
               </a:ext>
             </a:extLst>
           </p:cNvPr>
@@ -1882,7 +1882,7 @@
     </p:spTree>
     <p:extLst>
       <p:ext uri="{BB962C8B-B14F-4D97-AF65-F5344CB8AC3E}">
-        <p14:creationId xmlns:p14="http://schemas.microsoft.com/office/powerpoint/2010/main" val="3186656257"/>
+        <p14:creationId xmlns:p14="http://schemas.microsoft.com/office/powerpoint/2010/main" val="2673496678"/>
       </p:ext>
     </p:extLst>
   </p:cSld>
@@ -1914,7 +1914,7 @@
           <p:cNvPr id="2" name="Título 1">
             <a:extLst>
               <a:ext uri="{FF2B5EF4-FFF2-40B4-BE49-F238E27FC236}">
-                <a16:creationId xmlns:a16="http://schemas.microsoft.com/office/drawing/2014/main" id="{0B79C381-BC98-4000-BC05-48B379065D4B}"/>
+                <a16:creationId xmlns:a16="http://schemas.microsoft.com/office/drawing/2014/main" id="{3F016DF3-9629-4ADC-A2AD-AC92B2238353}"/>
               </a:ext>
             </a:extLst>
           </p:cNvPr>
@@ -1942,7 +1942,7 @@
           <p:cNvPr id="3" name="Espaço Reservado para Data 2">
             <a:extLst>
               <a:ext uri="{FF2B5EF4-FFF2-40B4-BE49-F238E27FC236}">
-                <a16:creationId xmlns:a16="http://schemas.microsoft.com/office/drawing/2014/main" id="{3A31FC3F-4E99-4EC2-A8F9-0F24BD1B07FD}"/>
+                <a16:creationId xmlns:a16="http://schemas.microsoft.com/office/drawing/2014/main" id="{C86B1C10-C5CD-4820-BAC2-E079DEA80F1B}"/>
               </a:ext>
             </a:extLst>
           </p:cNvPr>
@@ -1960,7 +1960,7 @@
           <a:p>
             <a:fld id="{0CB0AD37-FD0E-4325-A8C1-3F6096B2803B}" type="datetimeFigureOut">
               <a:rPr lang="pt-BR" smtClean="0"/>
-              <a:t>14/11/2020</a:t>
+              <a:t>23/11/2020</a:t>
             </a:fld>
             <a:endParaRPr lang="pt-BR"/>
           </a:p>
@@ -1971,7 +1971,7 @@
           <p:cNvPr id="4" name="Espaço Reservado para Rodapé 3">
             <a:extLst>
               <a:ext uri="{FF2B5EF4-FFF2-40B4-BE49-F238E27FC236}">
-                <a16:creationId xmlns:a16="http://schemas.microsoft.com/office/drawing/2014/main" id="{B61EDE85-D1BC-4621-932F-9ACC5F514309}"/>
+                <a16:creationId xmlns:a16="http://schemas.microsoft.com/office/drawing/2014/main" id="{13BEAA22-429E-4023-87B2-14FB4865EA65}"/>
               </a:ext>
             </a:extLst>
           </p:cNvPr>
@@ -1996,7 +1996,7 @@
           <p:cNvPr id="5" name="Espaço Reservado para Número de Slide 4">
             <a:extLst>
               <a:ext uri="{FF2B5EF4-FFF2-40B4-BE49-F238E27FC236}">
-                <a16:creationId xmlns:a16="http://schemas.microsoft.com/office/drawing/2014/main" id="{5CE9D37D-6F12-4DCB-BCBB-16B04219391B}"/>
+                <a16:creationId xmlns:a16="http://schemas.microsoft.com/office/drawing/2014/main" id="{1DC54839-C4A5-4D1A-BA51-E76FE5769988}"/>
               </a:ext>
             </a:extLst>
           </p:cNvPr>
@@ -2023,7 +2023,7 @@
     </p:spTree>
     <p:extLst>
       <p:ext uri="{BB962C8B-B14F-4D97-AF65-F5344CB8AC3E}">
-        <p14:creationId xmlns:p14="http://schemas.microsoft.com/office/powerpoint/2010/main" val="713886917"/>
+        <p14:creationId xmlns:p14="http://schemas.microsoft.com/office/powerpoint/2010/main" val="3809277463"/>
       </p:ext>
     </p:extLst>
   </p:cSld>
@@ -2055,7 +2055,7 @@
           <p:cNvPr id="2" name="Espaço Reservado para Data 1">
             <a:extLst>
               <a:ext uri="{FF2B5EF4-FFF2-40B4-BE49-F238E27FC236}">
-                <a16:creationId xmlns:a16="http://schemas.microsoft.com/office/drawing/2014/main" id="{F4480553-F64A-417C-B56C-BB2771442FE6}"/>
+                <a16:creationId xmlns:a16="http://schemas.microsoft.com/office/drawing/2014/main" id="{6BEBDB95-BD71-45EE-9287-59EBBFE014FB}"/>
               </a:ext>
             </a:extLst>
           </p:cNvPr>
@@ -2073,7 +2073,7 @@
           <a:p>
             <a:fld id="{0CB0AD37-FD0E-4325-A8C1-3F6096B2803B}" type="datetimeFigureOut">
               <a:rPr lang="pt-BR" smtClean="0"/>
-              <a:t>14/11/2020</a:t>
+              <a:t>23/11/2020</a:t>
             </a:fld>
             <a:endParaRPr lang="pt-BR"/>
           </a:p>
@@ -2084,7 +2084,7 @@
           <p:cNvPr id="3" name="Espaço Reservado para Rodapé 2">
             <a:extLst>
               <a:ext uri="{FF2B5EF4-FFF2-40B4-BE49-F238E27FC236}">
-                <a16:creationId xmlns:a16="http://schemas.microsoft.com/office/drawing/2014/main" id="{750745D7-A4ED-4C47-A458-74D15CD663E6}"/>
+                <a16:creationId xmlns:a16="http://schemas.microsoft.com/office/drawing/2014/main" id="{92103D41-61D7-4302-9974-B9F4A758D286}"/>
               </a:ext>
             </a:extLst>
           </p:cNvPr>
@@ -2109,7 +2109,7 @@
           <p:cNvPr id="4" name="Espaço Reservado para Número de Slide 3">
             <a:extLst>
               <a:ext uri="{FF2B5EF4-FFF2-40B4-BE49-F238E27FC236}">
-                <a16:creationId xmlns:a16="http://schemas.microsoft.com/office/drawing/2014/main" id="{854F8641-8107-43B0-BCE0-E7805AC828BC}"/>
+                <a16:creationId xmlns:a16="http://schemas.microsoft.com/office/drawing/2014/main" id="{E284948F-BE4D-4864-9156-79C43FFB7326}"/>
               </a:ext>
             </a:extLst>
           </p:cNvPr>
@@ -2136,7 +2136,7 @@
     </p:spTree>
     <p:extLst>
       <p:ext uri="{BB962C8B-B14F-4D97-AF65-F5344CB8AC3E}">
-        <p14:creationId xmlns:p14="http://schemas.microsoft.com/office/powerpoint/2010/main" val="2566189026"/>
+        <p14:creationId xmlns:p14="http://schemas.microsoft.com/office/powerpoint/2010/main" val="2289837090"/>
       </p:ext>
     </p:extLst>
   </p:cSld>
@@ -2168,7 +2168,7 @@
           <p:cNvPr id="2" name="Título 1">
             <a:extLst>
               <a:ext uri="{FF2B5EF4-FFF2-40B4-BE49-F238E27FC236}">
-                <a16:creationId xmlns:a16="http://schemas.microsoft.com/office/drawing/2014/main" id="{02D5D8EA-0377-423B-806A-E9FCD8A99F08}"/>
+                <a16:creationId xmlns:a16="http://schemas.microsoft.com/office/drawing/2014/main" id="{3CC032E2-D874-4E3A-A3CD-01DB4C0A0733}"/>
               </a:ext>
             </a:extLst>
           </p:cNvPr>
@@ -2205,7 +2205,7 @@
           <p:cNvPr id="3" name="Espaço Reservado para Conteúdo 2">
             <a:extLst>
               <a:ext uri="{FF2B5EF4-FFF2-40B4-BE49-F238E27FC236}">
-                <a16:creationId xmlns:a16="http://schemas.microsoft.com/office/drawing/2014/main" id="{E416DA5D-7EB7-45D0-BA59-BB6D25A49CC7}"/>
+                <a16:creationId xmlns:a16="http://schemas.microsoft.com/office/drawing/2014/main" id="{89DBFF67-A82C-42C2-97BD-AC0F17DF4BD3}"/>
               </a:ext>
             </a:extLst>
           </p:cNvPr>
@@ -2295,7 +2295,7 @@
           <p:cNvPr id="4" name="Espaço Reservado para Texto 3">
             <a:extLst>
               <a:ext uri="{FF2B5EF4-FFF2-40B4-BE49-F238E27FC236}">
-                <a16:creationId xmlns:a16="http://schemas.microsoft.com/office/drawing/2014/main" id="{CDF9E7F2-6924-4D33-B5E5-AE1CB25D3FFA}"/>
+                <a16:creationId xmlns:a16="http://schemas.microsoft.com/office/drawing/2014/main" id="{ADD76331-EB41-4429-9F11-BFC4DD6B69E5}"/>
               </a:ext>
             </a:extLst>
           </p:cNvPr>
@@ -2366,7 +2366,7 @@
           <p:cNvPr id="5" name="Espaço Reservado para Data 4">
             <a:extLst>
               <a:ext uri="{FF2B5EF4-FFF2-40B4-BE49-F238E27FC236}">
-                <a16:creationId xmlns:a16="http://schemas.microsoft.com/office/drawing/2014/main" id="{AFAAA6CF-38B3-43AC-8DBE-533FC8A22A03}"/>
+                <a16:creationId xmlns:a16="http://schemas.microsoft.com/office/drawing/2014/main" id="{4A8703A3-AC2B-4DC9-9571-1FFECB0C02C2}"/>
               </a:ext>
             </a:extLst>
           </p:cNvPr>
@@ -2384,7 +2384,7 @@
           <a:p>
             <a:fld id="{0CB0AD37-FD0E-4325-A8C1-3F6096B2803B}" type="datetimeFigureOut">
               <a:rPr lang="pt-BR" smtClean="0"/>
-              <a:t>14/11/2020</a:t>
+              <a:t>23/11/2020</a:t>
             </a:fld>
             <a:endParaRPr lang="pt-BR"/>
           </a:p>
@@ -2395,7 +2395,7 @@
           <p:cNvPr id="6" name="Espaço Reservado para Rodapé 5">
             <a:extLst>
               <a:ext uri="{FF2B5EF4-FFF2-40B4-BE49-F238E27FC236}">
-                <a16:creationId xmlns:a16="http://schemas.microsoft.com/office/drawing/2014/main" id="{CFC362D8-A69D-4DAE-8720-3F8C543CA68B}"/>
+                <a16:creationId xmlns:a16="http://schemas.microsoft.com/office/drawing/2014/main" id="{2BC696D1-704D-4809-B1EB-CAE52C61A23A}"/>
               </a:ext>
             </a:extLst>
           </p:cNvPr>
@@ -2420,7 +2420,7 @@
           <p:cNvPr id="7" name="Espaço Reservado para Número de Slide 6">
             <a:extLst>
               <a:ext uri="{FF2B5EF4-FFF2-40B4-BE49-F238E27FC236}">
-                <a16:creationId xmlns:a16="http://schemas.microsoft.com/office/drawing/2014/main" id="{08878B6D-6CF2-4EC2-A207-6C89EBE642C3}"/>
+                <a16:creationId xmlns:a16="http://schemas.microsoft.com/office/drawing/2014/main" id="{D67DC9FC-6688-41EE-8C47-50FB9ACF442C}"/>
               </a:ext>
             </a:extLst>
           </p:cNvPr>
@@ -2447,7 +2447,7 @@
     </p:spTree>
     <p:extLst>
       <p:ext uri="{BB962C8B-B14F-4D97-AF65-F5344CB8AC3E}">
-        <p14:creationId xmlns:p14="http://schemas.microsoft.com/office/powerpoint/2010/main" val="930342957"/>
+        <p14:creationId xmlns:p14="http://schemas.microsoft.com/office/powerpoint/2010/main" val="1291999715"/>
       </p:ext>
     </p:extLst>
   </p:cSld>
@@ -2479,7 +2479,7 @@
           <p:cNvPr id="2" name="Título 1">
             <a:extLst>
               <a:ext uri="{FF2B5EF4-FFF2-40B4-BE49-F238E27FC236}">
-                <a16:creationId xmlns:a16="http://schemas.microsoft.com/office/drawing/2014/main" id="{38B2DE24-A262-4C97-89DF-E843DAC28E93}"/>
+                <a16:creationId xmlns:a16="http://schemas.microsoft.com/office/drawing/2014/main" id="{6B846477-1091-4683-84F3-C546D7769E59}"/>
               </a:ext>
             </a:extLst>
           </p:cNvPr>
@@ -2516,7 +2516,7 @@
           <p:cNvPr id="3" name="Espaço Reservado para Imagem 2">
             <a:extLst>
               <a:ext uri="{FF2B5EF4-FFF2-40B4-BE49-F238E27FC236}">
-                <a16:creationId xmlns:a16="http://schemas.microsoft.com/office/drawing/2014/main" id="{36430E2C-82D8-4821-B7E0-C7AF7E87B8B2}"/>
+                <a16:creationId xmlns:a16="http://schemas.microsoft.com/office/drawing/2014/main" id="{627EE341-92BB-47CB-896D-E270CA5FB0C7}"/>
               </a:ext>
             </a:extLst>
           </p:cNvPr>
@@ -2583,7 +2583,7 @@
           <p:cNvPr id="4" name="Espaço Reservado para Texto 3">
             <a:extLst>
               <a:ext uri="{FF2B5EF4-FFF2-40B4-BE49-F238E27FC236}">
-                <a16:creationId xmlns:a16="http://schemas.microsoft.com/office/drawing/2014/main" id="{07F6F2CD-D5D7-441A-A391-C0A0E7AB6E88}"/>
+                <a16:creationId xmlns:a16="http://schemas.microsoft.com/office/drawing/2014/main" id="{28861906-A1A1-447D-934A-CC9423109847}"/>
               </a:ext>
             </a:extLst>
           </p:cNvPr>
@@ -2654,7 +2654,7 @@
           <p:cNvPr id="5" name="Espaço Reservado para Data 4">
             <a:extLst>
               <a:ext uri="{FF2B5EF4-FFF2-40B4-BE49-F238E27FC236}">
-                <a16:creationId xmlns:a16="http://schemas.microsoft.com/office/drawing/2014/main" id="{C621E45F-240B-4757-AB08-368FEF123012}"/>
+                <a16:creationId xmlns:a16="http://schemas.microsoft.com/office/drawing/2014/main" id="{29E7E416-8EC4-44CE-BEDB-F45D453643C0}"/>
               </a:ext>
             </a:extLst>
           </p:cNvPr>
@@ -2672,7 +2672,7 @@
           <a:p>
             <a:fld id="{0CB0AD37-FD0E-4325-A8C1-3F6096B2803B}" type="datetimeFigureOut">
               <a:rPr lang="pt-BR" smtClean="0"/>
-              <a:t>14/11/2020</a:t>
+              <a:t>23/11/2020</a:t>
             </a:fld>
             <a:endParaRPr lang="pt-BR"/>
           </a:p>
@@ -2683,7 +2683,7 @@
           <p:cNvPr id="6" name="Espaço Reservado para Rodapé 5">
             <a:extLst>
               <a:ext uri="{FF2B5EF4-FFF2-40B4-BE49-F238E27FC236}">
-                <a16:creationId xmlns:a16="http://schemas.microsoft.com/office/drawing/2014/main" id="{B90F376F-8B98-42CF-B56B-F37FD661475A}"/>
+                <a16:creationId xmlns:a16="http://schemas.microsoft.com/office/drawing/2014/main" id="{6979791F-A1A4-42E5-BC11-45C90AC0DC80}"/>
               </a:ext>
             </a:extLst>
           </p:cNvPr>
@@ -2708,7 +2708,7 @@
           <p:cNvPr id="7" name="Espaço Reservado para Número de Slide 6">
             <a:extLst>
               <a:ext uri="{FF2B5EF4-FFF2-40B4-BE49-F238E27FC236}">
-                <a16:creationId xmlns:a16="http://schemas.microsoft.com/office/drawing/2014/main" id="{826221CE-9662-443D-AD14-2841345EA06B}"/>
+                <a16:creationId xmlns:a16="http://schemas.microsoft.com/office/drawing/2014/main" id="{C43C4A58-5ADE-47E9-B967-7AD977F9EB8E}"/>
               </a:ext>
             </a:extLst>
           </p:cNvPr>
@@ -2735,7 +2735,7 @@
     </p:spTree>
     <p:extLst>
       <p:ext uri="{BB962C8B-B14F-4D97-AF65-F5344CB8AC3E}">
-        <p14:creationId xmlns:p14="http://schemas.microsoft.com/office/powerpoint/2010/main" val="2764644982"/>
+        <p14:creationId xmlns:p14="http://schemas.microsoft.com/office/powerpoint/2010/main" val="84387079"/>
       </p:ext>
     </p:extLst>
   </p:cSld>
@@ -2749,9 +2749,40 @@
 <p:sldMaster xmlns:a="http://schemas.openxmlformats.org/drawingml/2006/main" xmlns:r="http://schemas.openxmlformats.org/officeDocument/2006/relationships" xmlns:p="http://schemas.openxmlformats.org/presentationml/2006/main">
   <p:cSld>
     <p:bg>
-      <p:bgRef idx="1001">
-        <a:schemeClr val="bg1"/>
-      </p:bgRef>
+      <p:bgPr>
+        <a:gradFill flip="none" rotWithShape="1">
+          <a:gsLst>
+            <a:gs pos="41000">
+              <a:srgbClr val="EEEEEE"/>
+            </a:gs>
+            <a:gs pos="16000">
+              <a:schemeClr val="bg1">
+                <a:lumMod val="95000"/>
+              </a:schemeClr>
+            </a:gs>
+            <a:gs pos="55000">
+              <a:schemeClr val="accent3">
+                <a:lumMod val="45000"/>
+                <a:lumOff val="55000"/>
+              </a:schemeClr>
+            </a:gs>
+            <a:gs pos="76000">
+              <a:schemeClr val="accent3">
+                <a:lumMod val="45000"/>
+                <a:lumOff val="55000"/>
+              </a:schemeClr>
+            </a:gs>
+            <a:gs pos="91000">
+              <a:schemeClr val="bg1"/>
+            </a:gs>
+          </a:gsLst>
+          <a:path path="rect">
+            <a:fillToRect l="100000" t="100000"/>
+          </a:path>
+          <a:tileRect r="-100000" b="-100000"/>
+        </a:gradFill>
+        <a:effectLst/>
+      </p:bgPr>
     </p:bg>
     <p:spTree>
       <p:nvGrpSpPr>
@@ -2772,7 +2803,7 @@
           <p:cNvPr id="2" name="Espaço Reservado para Título 1">
             <a:extLst>
               <a:ext uri="{FF2B5EF4-FFF2-40B4-BE49-F238E27FC236}">
-                <a16:creationId xmlns:a16="http://schemas.microsoft.com/office/drawing/2014/main" id="{672A26A5-38B2-46A6-B2CA-8121ECB98C1E}"/>
+                <a16:creationId xmlns:a16="http://schemas.microsoft.com/office/drawing/2014/main" id="{8040B296-6571-498B-9522-92141C3C0794}"/>
               </a:ext>
             </a:extLst>
           </p:cNvPr>
@@ -2810,7 +2841,7 @@
           <p:cNvPr id="3" name="Espaço Reservado para Texto 2">
             <a:extLst>
               <a:ext uri="{FF2B5EF4-FFF2-40B4-BE49-F238E27FC236}">
-                <a16:creationId xmlns:a16="http://schemas.microsoft.com/office/drawing/2014/main" id="{92437802-F474-4A83-AEE5-B9B8FA87FDF0}"/>
+                <a16:creationId xmlns:a16="http://schemas.microsoft.com/office/drawing/2014/main" id="{C6AD8620-B1AC-48A0-8401-BF95DEC78960}"/>
               </a:ext>
             </a:extLst>
           </p:cNvPr>
@@ -2877,7 +2908,7 @@
           <p:cNvPr id="4" name="Espaço Reservado para Data 3">
             <a:extLst>
               <a:ext uri="{FF2B5EF4-FFF2-40B4-BE49-F238E27FC236}">
-                <a16:creationId xmlns:a16="http://schemas.microsoft.com/office/drawing/2014/main" id="{2A8E89A4-5B23-4FE4-8C88-0BED1DF04CBC}"/>
+                <a16:creationId xmlns:a16="http://schemas.microsoft.com/office/drawing/2014/main" id="{E094F991-D513-41B4-8302-1C3612E8F3CD}"/>
               </a:ext>
             </a:extLst>
           </p:cNvPr>
@@ -2913,7 +2944,7 @@
           <a:p>
             <a:fld id="{0CB0AD37-FD0E-4325-A8C1-3F6096B2803B}" type="datetimeFigureOut">
               <a:rPr lang="pt-BR" smtClean="0"/>
-              <a:t>14/11/2020</a:t>
+              <a:t>23/11/2020</a:t>
             </a:fld>
             <a:endParaRPr lang="pt-BR"/>
           </a:p>
@@ -2924,7 +2955,7 @@
           <p:cNvPr id="5" name="Espaço Reservado para Rodapé 4">
             <a:extLst>
               <a:ext uri="{FF2B5EF4-FFF2-40B4-BE49-F238E27FC236}">
-                <a16:creationId xmlns:a16="http://schemas.microsoft.com/office/drawing/2014/main" id="{9961E298-D07D-4581-97C1-F27B14FFE664}"/>
+                <a16:creationId xmlns:a16="http://schemas.microsoft.com/office/drawing/2014/main" id="{1A94D475-FE73-4DEB-9064-2F7524649304}"/>
               </a:ext>
             </a:extLst>
           </p:cNvPr>
@@ -2967,7 +2998,7 @@
           <p:cNvPr id="6" name="Espaço Reservado para Número de Slide 5">
             <a:extLst>
               <a:ext uri="{FF2B5EF4-FFF2-40B4-BE49-F238E27FC236}">
-                <a16:creationId xmlns:a16="http://schemas.microsoft.com/office/drawing/2014/main" id="{3B1849F6-B052-40C8-A5DD-1AAA91D78814}"/>
+                <a16:creationId xmlns:a16="http://schemas.microsoft.com/office/drawing/2014/main" id="{4AEE0720-A850-4C1E-AD28-645BBE6F6F06}"/>
               </a:ext>
             </a:extLst>
           </p:cNvPr>
@@ -3012,23 +3043,23 @@
     </p:spTree>
     <p:extLst>
       <p:ext uri="{BB962C8B-B14F-4D97-AF65-F5344CB8AC3E}">
-        <p14:creationId xmlns:p14="http://schemas.microsoft.com/office/powerpoint/2010/main" val="434531573"/>
+        <p14:creationId xmlns:p14="http://schemas.microsoft.com/office/powerpoint/2010/main" val="153813882"/>
       </p:ext>
     </p:extLst>
   </p:cSld>
   <p:clrMap bg1="lt1" tx1="dk1" bg2="lt2" tx2="dk2" accent1="accent1" accent2="accent2" accent3="accent3" accent4="accent4" accent5="accent5" accent6="accent6" hlink="hlink" folHlink="folHlink"/>
   <p:sldLayoutIdLst>
-    <p:sldLayoutId id="2147483649" r:id="rId1"/>
-    <p:sldLayoutId id="2147483650" r:id="rId2"/>
-    <p:sldLayoutId id="2147483651" r:id="rId3"/>
-    <p:sldLayoutId id="2147483652" r:id="rId4"/>
-    <p:sldLayoutId id="2147483653" r:id="rId5"/>
-    <p:sldLayoutId id="2147483654" r:id="rId6"/>
-    <p:sldLayoutId id="2147483655" r:id="rId7"/>
-    <p:sldLayoutId id="2147483656" r:id="rId8"/>
-    <p:sldLayoutId id="2147483657" r:id="rId9"/>
-    <p:sldLayoutId id="2147483658" r:id="rId10"/>
-    <p:sldLayoutId id="2147483659" r:id="rId11"/>
+    <p:sldLayoutId id="2147483887" r:id="rId1"/>
+    <p:sldLayoutId id="2147483888" r:id="rId2"/>
+    <p:sldLayoutId id="2147483889" r:id="rId3"/>
+    <p:sldLayoutId id="2147483890" r:id="rId4"/>
+    <p:sldLayoutId id="2147483891" r:id="rId5"/>
+    <p:sldLayoutId id="2147483892" r:id="rId6"/>
+    <p:sldLayoutId id="2147483893" r:id="rId7"/>
+    <p:sldLayoutId id="2147483894" r:id="rId8"/>
+    <p:sldLayoutId id="2147483895" r:id="rId9"/>
+    <p:sldLayoutId id="2147483896" r:id="rId10"/>
+    <p:sldLayoutId id="2147483897" r:id="rId11"/>
   </p:sldLayoutIdLst>
   <p:txStyles>
     <p:titleStyle>
@@ -3310,12 +3341,25 @@
       </a:lvl9pPr>
     </p:otherStyle>
   </p:txStyles>
+  <p:extLst>
+    <p:ext uri="{27BBF7A9-308A-43DC-89C8-2F10F3537804}">
+      <p15:sldGuideLst xmlns:p15="http://schemas.microsoft.com/office/powerpoint/2012/main"/>
+    </p:ext>
+  </p:extLst>
 </p:sldMaster>
 </file>
 
 <file path=ppt/slides/slide1.xml><?xml version="1.0" encoding="utf-8"?>
 <p:sld xmlns:a="http://schemas.openxmlformats.org/drawingml/2006/main" xmlns:r="http://schemas.openxmlformats.org/officeDocument/2006/relationships" xmlns:p="http://schemas.openxmlformats.org/presentationml/2006/main">
   <p:cSld>
+    <p:bg>
+      <p:bgPr>
+        <a:solidFill>
+          <a:schemeClr val="bg1"/>
+        </a:solidFill>
+        <a:effectLst/>
+      </p:bgPr>
+    </p:bg>
     <p:spTree>
       <p:nvGrpSpPr>
         <p:cNvPr id="1" name=""/>
@@ -3330,19 +3374,102 @@
           <a:chExt cx="0" cy="0"/>
         </a:xfrm>
       </p:grpSpPr>
+      <p:sp>
+        <p:nvSpPr>
+          <p:cNvPr id="2" name="Título 1">
+            <a:extLst>
+              <a:ext uri="{FF2B5EF4-FFF2-40B4-BE49-F238E27FC236}">
+                <a16:creationId xmlns:a16="http://schemas.microsoft.com/office/drawing/2014/main" id="{CC3B53CA-A4A0-49E8-9ED1-D6CCA0ABA8E3}"/>
+              </a:ext>
+            </a:extLst>
+          </p:cNvPr>
+          <p:cNvSpPr>
+            <a:spLocks noGrp="1"/>
+          </p:cNvSpPr>
+          <p:nvPr>
+            <p:ph type="title"/>
+          </p:nvPr>
+        </p:nvSpPr>
+        <p:spPr>
+          <a:xfrm>
+            <a:off x="1524000" y="2751125"/>
+            <a:ext cx="9144000" cy="1355750"/>
+          </a:xfrm>
+          <a:ln>
+            <a:noFill/>
+          </a:ln>
+          <a:effectLst>
+            <a:outerShdw blurRad="190500" dist="228600" dir="2700000" algn="ctr">
+              <a:srgbClr val="000000">
+                <a:alpha val="30000"/>
+              </a:srgbClr>
+            </a:outerShdw>
+          </a:effectLst>
+          <a:scene3d>
+            <a:camera prst="orthographicFront">
+              <a:rot lat="0" lon="0" rev="0"/>
+            </a:camera>
+            <a:lightRig rig="glow" dir="t">
+              <a:rot lat="0" lon="0" rev="4800000"/>
+            </a:lightRig>
+          </a:scene3d>
+          <a:sp3d prstMaterial="matte">
+            <a:bevelT w="127000" h="63500"/>
+          </a:sp3d>
+        </p:spPr>
+        <p:txBody>
+          <a:bodyPr vert="horz" lIns="91440" tIns="45720" rIns="91440" bIns="45720" rtlCol="0" anchor="b">
+            <a:normAutofit/>
+          </a:bodyPr>
+          <a:lstStyle/>
+          <a:p>
+            <a:pPr algn="ctr"/>
+            <a:r>
+              <a:rPr lang="en-US" sz="4600" b="1" dirty="0" err="1"/>
+              <a:t>Projeto</a:t>
+            </a:r>
+            <a:r>
+              <a:rPr lang="en-US" sz="4600" b="1" dirty="0"/>
+              <a:t> </a:t>
+            </a:r>
+            <a:r>
+              <a:rPr lang="en-US" sz="4600" b="1" dirty="0" err="1"/>
+              <a:t>Integrador</a:t>
+            </a:r>
+            <a:br>
+              <a:rPr lang="en-US" sz="4600" b="1" dirty="0"/>
+            </a:br>
+            <a:r>
+              <a:rPr lang="en-US" sz="4600" b="1" dirty="0" err="1"/>
+              <a:t>Planejamento</a:t>
+            </a:r>
+            <a:r>
+              <a:rPr lang="en-US" sz="4600" b="1" dirty="0"/>
+              <a:t> de </a:t>
+            </a:r>
+            <a:r>
+              <a:rPr lang="en-US" sz="4600" b="1" dirty="0" err="1"/>
+              <a:t>Manutenção</a:t>
+            </a:r>
+            <a:endParaRPr lang="en-US" sz="4600" b="1" dirty="0"/>
+          </a:p>
+        </p:txBody>
+      </p:sp>
       <p:pic>
         <p:nvPicPr>
-          <p:cNvPr id="1030" name="Picture 6">
-            <a:extLst>
-              <a:ext uri="{FF2B5EF4-FFF2-40B4-BE49-F238E27FC236}">
-                <a16:creationId xmlns:a16="http://schemas.microsoft.com/office/drawing/2014/main" id="{D250680F-D585-46FD-BCE7-0848E619C573}"/>
+          <p:cNvPr id="4" name="Picture 2">
+            <a:extLst>
+              <a:ext uri="{FF2B5EF4-FFF2-40B4-BE49-F238E27FC236}">
+                <a16:creationId xmlns:a16="http://schemas.microsoft.com/office/drawing/2014/main" id="{35174960-5613-435B-8364-36F97EE9D004}"/>
               </a:ext>
             </a:extLst>
           </p:cNvPr>
           <p:cNvPicPr>
-            <a:picLocks noChangeAspect="1" noChangeArrowheads="1"/>
+            <a:picLocks noGrp="1" noChangeAspect="1" noChangeArrowheads="1"/>
           </p:cNvPicPr>
-          <p:nvPr/>
+          <p:nvPr>
+            <p:ph idx="1"/>
+          </p:nvPr>
         </p:nvPicPr>
         <p:blipFill rotWithShape="1">
           <a:blip r:embed="rId2">
@@ -3352,17 +3479,38 @@
               </a:ext>
             </a:extLst>
           </a:blip>
-          <a:srcRect l="7288" t="9004" r="20466" b="7121"/>
+          <a:srcRect t="12215" r="-3" b="-3"/>
           <a:stretch/>
         </p:blipFill>
         <p:spPr bwMode="auto">
           <a:xfrm>
-            <a:off x="7553490" y="2948246"/>
-            <a:ext cx="4055414" cy="3668755"/>
+            <a:off x="20" y="10"/>
+            <a:ext cx="5920598" cy="2130941"/>
           </a:xfrm>
-          <a:prstGeom prst="rect">
+          <a:custGeom>
             <a:avLst/>
-          </a:prstGeom>
+            <a:gdLst/>
+            <a:ahLst/>
+            <a:cxnLst/>
+            <a:rect l="l" t="t" r="r" b="b"/>
+            <a:pathLst>
+              <a:path w="5920618" h="2130951">
+                <a:moveTo>
+                  <a:pt x="0" y="0"/>
+                </a:moveTo>
+                <a:lnTo>
+                  <a:pt x="5920618" y="0"/>
+                </a:lnTo>
+                <a:lnTo>
+                  <a:pt x="4933709" y="2130951"/>
+                </a:lnTo>
+                <a:lnTo>
+                  <a:pt x="0" y="2130951"/>
+                </a:lnTo>
+                <a:close/>
+              </a:path>
+            </a:pathLst>
+          </a:custGeom>
           <a:noFill/>
           <a:extLst>
             <a:ext uri="{909E8E84-426E-40DD-AFC4-6F175D3DCCD1}">
@@ -3377,167 +3525,632 @@
       </p:pic>
       <p:sp>
         <p:nvSpPr>
-          <p:cNvPr id="2" name="Título 1">
-            <a:extLst>
-              <a:ext uri="{FF2B5EF4-FFF2-40B4-BE49-F238E27FC236}">
-                <a16:creationId xmlns:a16="http://schemas.microsoft.com/office/drawing/2014/main" id="{3F4885BC-4579-42FB-BA69-1AF26CED3299}"/>
-              </a:ext>
-            </a:extLst>
-          </p:cNvPr>
-          <p:cNvSpPr>
-            <a:spLocks noGrp="1"/>
-          </p:cNvSpPr>
-          <p:nvPr>
-            <p:ph type="ctrTitle"/>
+          <p:cNvPr id="11" name="Freeform 16">
+            <a:extLst>
+              <a:ext uri="{FF2B5EF4-FFF2-40B4-BE49-F238E27FC236}">
+                <a16:creationId xmlns:a16="http://schemas.microsoft.com/office/drawing/2014/main" id="{B0BDD275-E79C-4B6F-9875-E474D59DC552}"/>
+              </a:ext>
+              <a:ext uri="{C183D7F6-B498-43B3-948B-1728B52AA6E4}">
+                <adec:decorative xmlns:adec="http://schemas.microsoft.com/office/drawing/2017/decorative" val="1"/>
+              </a:ext>
+            </a:extLst>
+          </p:cNvPr>
+          <p:cNvSpPr>
+            <a:spLocks noGrp="1" noRot="1" noChangeAspect="1" noMove="1" noResize="1" noEditPoints="1" noAdjustHandles="1" noChangeArrowheads="1" noChangeShapeType="1" noTextEdit="1"/>
+          </p:cNvSpPr>
+          <p:nvPr>
+            <p:extLst>
+              <p:ext uri="{386F3935-93C4-4BCD-93E2-E3B085C9AB24}">
+                <p16:designElem xmlns:p16="http://schemas.microsoft.com/office/powerpoint/2015/main" val="1"/>
+              </p:ext>
+            </p:extLst>
           </p:nvPr>
         </p:nvSpPr>
         <p:spPr>
           <a:xfrm>
-            <a:off x="1524000" y="1199880"/>
-            <a:ext cx="9144000" cy="1406621"/>
+            <a:off x="5107752" y="0"/>
+            <a:ext cx="7084249" cy="2130552"/>
           </a:xfrm>
+          <a:custGeom>
+            <a:avLst/>
+            <a:gdLst>
+              <a:gd name="connsiteX0" fmla="*/ 986725 w 7084249"/>
+              <a:gd name="connsiteY0" fmla="*/ 0 h 2130552"/>
+              <a:gd name="connsiteX1" fmla="*/ 7084249 w 7084249"/>
+              <a:gd name="connsiteY1" fmla="*/ 0 h 2130552"/>
+              <a:gd name="connsiteX2" fmla="*/ 7084249 w 7084249"/>
+              <a:gd name="connsiteY2" fmla="*/ 2130552 h 2130552"/>
+              <a:gd name="connsiteX3" fmla="*/ 0 w 7084249"/>
+              <a:gd name="connsiteY3" fmla="*/ 2130552 h 2130552"/>
+            </a:gdLst>
+            <a:ahLst/>
+            <a:cxnLst>
+              <a:cxn ang="0">
+                <a:pos x="connsiteX0" y="connsiteY0"/>
+              </a:cxn>
+              <a:cxn ang="0">
+                <a:pos x="connsiteX1" y="connsiteY1"/>
+              </a:cxn>
+              <a:cxn ang="0">
+                <a:pos x="connsiteX2" y="connsiteY2"/>
+              </a:cxn>
+              <a:cxn ang="0">
+                <a:pos x="connsiteX3" y="connsiteY3"/>
+              </a:cxn>
+            </a:cxnLst>
+            <a:rect l="l" t="t" r="r" b="b"/>
+            <a:pathLst>
+              <a:path w="7084249" h="2130552">
+                <a:moveTo>
+                  <a:pt x="986725" y="0"/>
+                </a:moveTo>
+                <a:lnTo>
+                  <a:pt x="7084249" y="0"/>
+                </a:lnTo>
+                <a:lnTo>
+                  <a:pt x="7084249" y="2130552"/>
+                </a:lnTo>
+                <a:lnTo>
+                  <a:pt x="0" y="2130552"/>
+                </a:lnTo>
+                <a:close/>
+              </a:path>
+            </a:pathLst>
+          </a:custGeom>
+          <a:solidFill>
+            <a:srgbClr val="B4B4B4">
+              <a:alpha val="50000"/>
+            </a:srgbClr>
+          </a:solidFill>
+          <a:ln>
+            <a:noFill/>
+          </a:ln>
         </p:spPr>
-        <p:txBody>
-          <a:bodyPr>
+        <p:style>
+          <a:lnRef idx="2">
+            <a:schemeClr val="accent1">
+              <a:shade val="50000"/>
+            </a:schemeClr>
+          </a:lnRef>
+          <a:fillRef idx="1">
+            <a:schemeClr val="accent1"/>
+          </a:fillRef>
+          <a:effectRef idx="0">
+            <a:schemeClr val="accent1"/>
+          </a:effectRef>
+          <a:fontRef idx="minor">
+            <a:schemeClr val="lt1"/>
+          </a:fontRef>
+        </p:style>
+        <p:txBody>
+          <a:bodyPr rtlCol="0" anchor="ctr"/>
+          <a:lstStyle/>
+          <a:p>
+            <a:pPr algn="ctr"/>
+            <a:endParaRPr lang="en-US"/>
+          </a:p>
+        </p:txBody>
+      </p:sp>
+      <p:sp>
+        <p:nvSpPr>
+          <p:cNvPr id="13" name="Freeform 19">
+            <a:extLst>
+              <a:ext uri="{FF2B5EF4-FFF2-40B4-BE49-F238E27FC236}">
+                <a16:creationId xmlns:a16="http://schemas.microsoft.com/office/drawing/2014/main" id="{FFE24BB0-6C00-4CD0-B19A-F41513025703}"/>
+              </a:ext>
+              <a:ext uri="{C183D7F6-B498-43B3-948B-1728B52AA6E4}">
+                <adec:decorative xmlns:adec="http://schemas.microsoft.com/office/drawing/2017/decorative" val="1"/>
+              </a:ext>
+            </a:extLst>
+          </p:cNvPr>
+          <p:cNvSpPr>
+            <a:spLocks noGrp="1" noRot="1" noChangeAspect="1" noMove="1" noResize="1" noEditPoints="1" noAdjustHandles="1" noChangeArrowheads="1" noChangeShapeType="1" noTextEdit="1"/>
+          </p:cNvSpPr>
+          <p:nvPr>
+            <p:extLst>
+              <p:ext uri="{386F3935-93C4-4BCD-93E2-E3B085C9AB24}">
+                <p16:designElem xmlns:p16="http://schemas.microsoft.com/office/powerpoint/2015/main" val="1"/>
+              </p:ext>
+            </p:extLst>
+          </p:nvPr>
+        </p:nvSpPr>
+        <p:spPr>
+          <a:xfrm>
+            <a:off x="6266810" y="4683319"/>
+            <a:ext cx="5925190" cy="2174681"/>
+          </a:xfrm>
+          <a:custGeom>
+            <a:avLst/>
+            <a:gdLst>
+              <a:gd name="connsiteX0" fmla="*/ 1007162 w 5925190"/>
+              <a:gd name="connsiteY0" fmla="*/ 0 h 2174681"/>
+              <a:gd name="connsiteX1" fmla="*/ 5925190 w 5925190"/>
+              <a:gd name="connsiteY1" fmla="*/ 0 h 2174681"/>
+              <a:gd name="connsiteX2" fmla="*/ 5925190 w 5925190"/>
+              <a:gd name="connsiteY2" fmla="*/ 2174681 h 2174681"/>
+              <a:gd name="connsiteX3" fmla="*/ 0 w 5925190"/>
+              <a:gd name="connsiteY3" fmla="*/ 2174681 h 2174681"/>
+            </a:gdLst>
+            <a:ahLst/>
+            <a:cxnLst>
+              <a:cxn ang="0">
+                <a:pos x="connsiteX0" y="connsiteY0"/>
+              </a:cxn>
+              <a:cxn ang="0">
+                <a:pos x="connsiteX1" y="connsiteY1"/>
+              </a:cxn>
+              <a:cxn ang="0">
+                <a:pos x="connsiteX2" y="connsiteY2"/>
+              </a:cxn>
+              <a:cxn ang="0">
+                <a:pos x="connsiteX3" y="connsiteY3"/>
+              </a:cxn>
+            </a:cxnLst>
+            <a:rect l="l" t="t" r="r" b="b"/>
+            <a:pathLst>
+              <a:path w="5925190" h="2174681">
+                <a:moveTo>
+                  <a:pt x="1007162" y="0"/>
+                </a:moveTo>
+                <a:lnTo>
+                  <a:pt x="5925190" y="0"/>
+                </a:lnTo>
+                <a:lnTo>
+                  <a:pt x="5925190" y="2174681"/>
+                </a:lnTo>
+                <a:lnTo>
+                  <a:pt x="0" y="2174681"/>
+                </a:lnTo>
+                <a:close/>
+              </a:path>
+            </a:pathLst>
+          </a:custGeom>
+          <a:solidFill>
+            <a:srgbClr val="262626"/>
+          </a:solidFill>
+          <a:ln>
+            <a:noFill/>
+          </a:ln>
+        </p:spPr>
+        <p:style>
+          <a:lnRef idx="2">
+            <a:schemeClr val="accent1">
+              <a:shade val="50000"/>
+            </a:schemeClr>
+          </a:lnRef>
+          <a:fillRef idx="1">
+            <a:schemeClr val="accent1"/>
+          </a:fillRef>
+          <a:effectRef idx="0">
+            <a:schemeClr val="accent1"/>
+          </a:effectRef>
+          <a:fontRef idx="minor">
+            <a:schemeClr val="lt1"/>
+          </a:fontRef>
+        </p:style>
+        <p:txBody>
+          <a:bodyPr wrap="square" rtlCol="0" anchor="ctr">
             <a:noAutofit/>
           </a:bodyPr>
           <a:lstStyle/>
           <a:p>
-            <a:r>
-              <a:rPr lang="pt-BR" sz="5000" b="1" dirty="0"/>
-              <a:t>Projeto Integrador</a:t>
-            </a:r>
-            <a:br>
-              <a:rPr lang="pt-BR" sz="5000" b="1" dirty="0"/>
-            </a:br>
-            <a:r>
-              <a:rPr lang="pt-BR" sz="5000" b="1" dirty="0"/>
-              <a:t>Planejamento de Manutenção</a:t>
-            </a:r>
-          </a:p>
-        </p:txBody>
-      </p:sp>
-      <p:sp>
-        <p:nvSpPr>
-          <p:cNvPr id="3" name="Subtítulo 2">
-            <a:extLst>
-              <a:ext uri="{FF2B5EF4-FFF2-40B4-BE49-F238E27FC236}">
-                <a16:creationId xmlns:a16="http://schemas.microsoft.com/office/drawing/2014/main" id="{B8F755FB-6D8A-4E30-89C2-F225046EC19A}"/>
-              </a:ext>
-            </a:extLst>
-          </p:cNvPr>
-          <p:cNvSpPr>
-            <a:spLocks noGrp="1"/>
-          </p:cNvSpPr>
-          <p:nvPr>
-            <p:ph type="subTitle" idx="1"/>
+            <a:pPr algn="ctr"/>
+            <a:endParaRPr lang="en-US"/>
+          </a:p>
+        </p:txBody>
+      </p:sp>
+      <p:sp>
+        <p:nvSpPr>
+          <p:cNvPr id="15" name="Freeform 22">
+            <a:extLst>
+              <a:ext uri="{FF2B5EF4-FFF2-40B4-BE49-F238E27FC236}">
+                <a16:creationId xmlns:a16="http://schemas.microsoft.com/office/drawing/2014/main" id="{045D7A58-411F-4E92-A78E-A6FEB18900BF}"/>
+              </a:ext>
+              <a:ext uri="{C183D7F6-B498-43B3-948B-1728B52AA6E4}">
+                <adec:decorative xmlns:adec="http://schemas.microsoft.com/office/drawing/2017/decorative" val="1"/>
+              </a:ext>
+            </a:extLst>
+          </p:cNvPr>
+          <p:cNvSpPr>
+            <a:spLocks noGrp="1" noRot="1" noChangeAspect="1" noMove="1" noResize="1" noEditPoints="1" noAdjustHandles="1" noChangeArrowheads="1" noChangeShapeType="1" noTextEdit="1"/>
+          </p:cNvSpPr>
+          <p:nvPr>
+            <p:extLst>
+              <p:ext uri="{386F3935-93C4-4BCD-93E2-E3B085C9AB24}">
+                <p16:designElem xmlns:p16="http://schemas.microsoft.com/office/powerpoint/2015/main" val="1"/>
+              </p:ext>
+            </p:extLst>
           </p:nvPr>
         </p:nvSpPr>
         <p:spPr>
           <a:xfrm>
-            <a:off x="874646" y="3057700"/>
-            <a:ext cx="9144000" cy="2387600"/>
+            <a:off x="0" y="4681728"/>
+            <a:ext cx="7112212" cy="2176272"/>
           </a:xfrm>
+          <a:custGeom>
+            <a:avLst/>
+            <a:gdLst>
+              <a:gd name="connsiteX0" fmla="*/ 0 w 7112212"/>
+              <a:gd name="connsiteY0" fmla="*/ 0 h 2176272"/>
+              <a:gd name="connsiteX1" fmla="*/ 7112212 w 7112212"/>
+              <a:gd name="connsiteY1" fmla="*/ 0 h 2176272"/>
+              <a:gd name="connsiteX2" fmla="*/ 6104313 w 7112212"/>
+              <a:gd name="connsiteY2" fmla="*/ 2176272 h 2176272"/>
+              <a:gd name="connsiteX3" fmla="*/ 0 w 7112212"/>
+              <a:gd name="connsiteY3" fmla="*/ 2176272 h 2176272"/>
+            </a:gdLst>
+            <a:ahLst/>
+            <a:cxnLst>
+              <a:cxn ang="0">
+                <a:pos x="connsiteX0" y="connsiteY0"/>
+              </a:cxn>
+              <a:cxn ang="0">
+                <a:pos x="connsiteX1" y="connsiteY1"/>
+              </a:cxn>
+              <a:cxn ang="0">
+                <a:pos x="connsiteX2" y="connsiteY2"/>
+              </a:cxn>
+              <a:cxn ang="0">
+                <a:pos x="connsiteX3" y="connsiteY3"/>
+              </a:cxn>
+            </a:cxnLst>
+            <a:rect l="l" t="t" r="r" b="b"/>
+            <a:pathLst>
+              <a:path w="7112212" h="2176272">
+                <a:moveTo>
+                  <a:pt x="0" y="0"/>
+                </a:moveTo>
+                <a:lnTo>
+                  <a:pt x="7112212" y="0"/>
+                </a:lnTo>
+                <a:lnTo>
+                  <a:pt x="6104313" y="2176272"/>
+                </a:lnTo>
+                <a:lnTo>
+                  <a:pt x="0" y="2176272"/>
+                </a:lnTo>
+                <a:close/>
+              </a:path>
+            </a:pathLst>
+          </a:custGeom>
+          <a:solidFill>
+            <a:srgbClr val="B4B4B4">
+              <a:alpha val="50000"/>
+            </a:srgbClr>
+          </a:solidFill>
+          <a:ln>
+            <a:noFill/>
+          </a:ln>
         </p:spPr>
-        <p:txBody>
-          <a:bodyPr>
-            <a:noAutofit/>
+        <p:style>
+          <a:lnRef idx="2">
+            <a:schemeClr val="accent1">
+              <a:shade val="50000"/>
+            </a:schemeClr>
+          </a:lnRef>
+          <a:fillRef idx="1">
+            <a:schemeClr val="accent1"/>
+          </a:fillRef>
+          <a:effectRef idx="0">
+            <a:schemeClr val="accent1"/>
+          </a:effectRef>
+          <a:fontRef idx="minor">
+            <a:schemeClr val="lt1"/>
+          </a:fontRef>
+        </p:style>
+        <p:txBody>
+          <a:bodyPr rtlCol="0" anchor="ctr"/>
+          <a:lstStyle/>
+          <a:p>
+            <a:pPr algn="ctr"/>
+            <a:endParaRPr lang="en-US"/>
+          </a:p>
+        </p:txBody>
+      </p:sp>
+      <p:sp>
+        <p:nvSpPr>
+          <p:cNvPr id="6" name="Subtítulo 2">
+            <a:extLst>
+              <a:ext uri="{FF2B5EF4-FFF2-40B4-BE49-F238E27FC236}">
+                <a16:creationId xmlns:a16="http://schemas.microsoft.com/office/drawing/2014/main" id="{3B52DA24-04DF-42E2-9A96-96415D4AC6F3}"/>
+              </a:ext>
+            </a:extLst>
+          </p:cNvPr>
+          <p:cNvSpPr txBox="1">
+            <a:spLocks/>
+          </p:cNvSpPr>
+          <p:nvPr/>
+        </p:nvSpPr>
+        <p:spPr>
+          <a:xfrm>
+            <a:off x="3993300" y="4106875"/>
+            <a:ext cx="8016874" cy="3643137"/>
+          </a:xfrm>
+          <a:prstGeom prst="rect">
+            <a:avLst/>
+          </a:prstGeom>
+        </p:spPr>
+        <p:txBody>
+          <a:bodyPr vert="horz" lIns="91440" tIns="45720" rIns="91440" bIns="45720" rtlCol="0" anchor="t">
+            <a:normAutofit/>
           </a:bodyPr>
-          <a:lstStyle/>
-          <a:p>
-            <a:pPr algn="l"/>
-            <a:r>
-              <a:rPr lang="pt-BR" sz="2500" b="1" dirty="0">
+          <a:lstStyle>
+            <a:lvl1pPr marL="228600" indent="-228600" algn="l" defTabSz="914400" rtl="0" eaLnBrk="1" latinLnBrk="0" hangingPunct="1">
+              <a:lnSpc>
+                <a:spcPct val="90000"/>
+              </a:lnSpc>
+              <a:spcBef>
+                <a:spcPts val="1000"/>
+              </a:spcBef>
+              <a:buFont typeface="Arial" panose="020B0604020202020204" pitchFamily="34" charset="0"/>
+              <a:buChar char="•"/>
+              <a:defRPr sz="2800" kern="1200">
+                <a:solidFill>
+                  <a:schemeClr val="tx1"/>
+                </a:solidFill>
+                <a:latin typeface="+mn-lt"/>
+                <a:ea typeface="+mn-ea"/>
+                <a:cs typeface="+mn-cs"/>
+              </a:defRPr>
+            </a:lvl1pPr>
+            <a:lvl2pPr marL="685800" indent="-228600" algn="l" defTabSz="914400" rtl="0" eaLnBrk="1" latinLnBrk="0" hangingPunct="1">
+              <a:lnSpc>
+                <a:spcPct val="90000"/>
+              </a:lnSpc>
+              <a:spcBef>
+                <a:spcPts val="500"/>
+              </a:spcBef>
+              <a:buFont typeface="Arial" panose="020B0604020202020204" pitchFamily="34" charset="0"/>
+              <a:buChar char="•"/>
+              <a:defRPr sz="2400" kern="1200">
+                <a:solidFill>
+                  <a:schemeClr val="tx1"/>
+                </a:solidFill>
+                <a:latin typeface="+mn-lt"/>
+                <a:ea typeface="+mn-ea"/>
+                <a:cs typeface="+mn-cs"/>
+              </a:defRPr>
+            </a:lvl2pPr>
+            <a:lvl3pPr marL="1143000" indent="-228600" algn="l" defTabSz="914400" rtl="0" eaLnBrk="1" latinLnBrk="0" hangingPunct="1">
+              <a:lnSpc>
+                <a:spcPct val="90000"/>
+              </a:lnSpc>
+              <a:spcBef>
+                <a:spcPts val="500"/>
+              </a:spcBef>
+              <a:buFont typeface="Arial" panose="020B0604020202020204" pitchFamily="34" charset="0"/>
+              <a:buChar char="•"/>
+              <a:defRPr sz="2000" kern="1200">
+                <a:solidFill>
+                  <a:schemeClr val="tx1"/>
+                </a:solidFill>
+                <a:latin typeface="+mn-lt"/>
+                <a:ea typeface="+mn-ea"/>
+                <a:cs typeface="+mn-cs"/>
+              </a:defRPr>
+            </a:lvl3pPr>
+            <a:lvl4pPr marL="1600200" indent="-228600" algn="l" defTabSz="914400" rtl="0" eaLnBrk="1" latinLnBrk="0" hangingPunct="1">
+              <a:lnSpc>
+                <a:spcPct val="90000"/>
+              </a:lnSpc>
+              <a:spcBef>
+                <a:spcPts val="500"/>
+              </a:spcBef>
+              <a:buFont typeface="Arial" panose="020B0604020202020204" pitchFamily="34" charset="0"/>
+              <a:buChar char="•"/>
+              <a:defRPr sz="1800" kern="1200">
+                <a:solidFill>
+                  <a:schemeClr val="tx1"/>
+                </a:solidFill>
+                <a:latin typeface="+mn-lt"/>
+                <a:ea typeface="+mn-ea"/>
+                <a:cs typeface="+mn-cs"/>
+              </a:defRPr>
+            </a:lvl4pPr>
+            <a:lvl5pPr marL="2057400" indent="-228600" algn="l" defTabSz="914400" rtl="0" eaLnBrk="1" latinLnBrk="0" hangingPunct="1">
+              <a:lnSpc>
+                <a:spcPct val="90000"/>
+              </a:lnSpc>
+              <a:spcBef>
+                <a:spcPts val="500"/>
+              </a:spcBef>
+              <a:buFont typeface="Arial" panose="020B0604020202020204" pitchFamily="34" charset="0"/>
+              <a:buChar char="•"/>
+              <a:defRPr sz="1800" kern="1200">
+                <a:solidFill>
+                  <a:schemeClr val="tx1"/>
+                </a:solidFill>
+                <a:latin typeface="+mn-lt"/>
+                <a:ea typeface="+mn-ea"/>
+                <a:cs typeface="+mn-cs"/>
+              </a:defRPr>
+            </a:lvl5pPr>
+            <a:lvl6pPr marL="2514600" indent="-228600" algn="l" defTabSz="914400" rtl="0" eaLnBrk="1" latinLnBrk="0" hangingPunct="1">
+              <a:lnSpc>
+                <a:spcPct val="90000"/>
+              </a:lnSpc>
+              <a:spcBef>
+                <a:spcPts val="500"/>
+              </a:spcBef>
+              <a:buFont typeface="Arial" panose="020B0604020202020204" pitchFamily="34" charset="0"/>
+              <a:buChar char="•"/>
+              <a:defRPr sz="1800" kern="1200">
+                <a:solidFill>
+                  <a:schemeClr val="tx1"/>
+                </a:solidFill>
+                <a:latin typeface="+mn-lt"/>
+                <a:ea typeface="+mn-ea"/>
+                <a:cs typeface="+mn-cs"/>
+              </a:defRPr>
+            </a:lvl6pPr>
+            <a:lvl7pPr marL="2971800" indent="-228600" algn="l" defTabSz="914400" rtl="0" eaLnBrk="1" latinLnBrk="0" hangingPunct="1">
+              <a:lnSpc>
+                <a:spcPct val="90000"/>
+              </a:lnSpc>
+              <a:spcBef>
+                <a:spcPts val="500"/>
+              </a:spcBef>
+              <a:buFont typeface="Arial" panose="020B0604020202020204" pitchFamily="34" charset="0"/>
+              <a:buChar char="•"/>
+              <a:defRPr sz="1800" kern="1200">
+                <a:solidFill>
+                  <a:schemeClr val="tx1"/>
+                </a:solidFill>
+                <a:latin typeface="+mn-lt"/>
+                <a:ea typeface="+mn-ea"/>
+                <a:cs typeface="+mn-cs"/>
+              </a:defRPr>
+            </a:lvl7pPr>
+            <a:lvl8pPr marL="3429000" indent="-228600" algn="l" defTabSz="914400" rtl="0" eaLnBrk="1" latinLnBrk="0" hangingPunct="1">
+              <a:lnSpc>
+                <a:spcPct val="90000"/>
+              </a:lnSpc>
+              <a:spcBef>
+                <a:spcPts val="500"/>
+              </a:spcBef>
+              <a:buFont typeface="Arial" panose="020B0604020202020204" pitchFamily="34" charset="0"/>
+              <a:buChar char="•"/>
+              <a:defRPr sz="1800" kern="1200">
+                <a:solidFill>
+                  <a:schemeClr val="tx1"/>
+                </a:solidFill>
+                <a:latin typeface="+mn-lt"/>
+                <a:ea typeface="+mn-ea"/>
+                <a:cs typeface="+mn-cs"/>
+              </a:defRPr>
+            </a:lvl8pPr>
+            <a:lvl9pPr marL="3886200" indent="-228600" algn="l" defTabSz="914400" rtl="0" eaLnBrk="1" latinLnBrk="0" hangingPunct="1">
+              <a:lnSpc>
+                <a:spcPct val="90000"/>
+              </a:lnSpc>
+              <a:spcBef>
+                <a:spcPts val="500"/>
+              </a:spcBef>
+              <a:buFont typeface="Arial" panose="020B0604020202020204" pitchFamily="34" charset="0"/>
+              <a:buChar char="•"/>
+              <a:defRPr sz="1800" kern="1200">
+                <a:solidFill>
+                  <a:schemeClr val="tx1"/>
+                </a:solidFill>
+                <a:latin typeface="+mn-lt"/>
+                <a:ea typeface="+mn-ea"/>
+                <a:cs typeface="+mn-cs"/>
+              </a:defRPr>
+            </a:lvl9pPr>
+          </a:lstStyle>
+          <a:p>
+            <a:pPr marL="0" indent="0" algn="r">
+              <a:buNone/>
+            </a:pPr>
+            <a:r>
+              <a:rPr lang="pt-BR" b="1" dirty="0">
                 <a:latin typeface="+mj-lt"/>
               </a:rPr>
               <a:t>INTEGRANTES</a:t>
             </a:r>
           </a:p>
           <a:p>
-            <a:pPr algn="l"/>
-            <a:r>
-              <a:rPr lang="pt-BR" sz="2500" dirty="0">
+            <a:pPr marL="0" indent="0" algn="r">
+              <a:buNone/>
+            </a:pPr>
+            <a:r>
+              <a:rPr lang="pt-BR" sz="2400" dirty="0" err="1">
                 <a:solidFill>
-                  <a:srgbClr val="000000"/>
+                  <a:schemeClr val="bg1"/>
                 </a:solidFill>
-                <a:effectLst/>
-                <a:latin typeface="+mj-lt"/>
                 <a:ea typeface="Calibri" panose="020F0502020204030204" pitchFamily="34" charset="0"/>
               </a:rPr>
-              <a:t>Indianara Aparecida Costa Pinheiro </a:t>
-            </a:r>
-          </a:p>
-          <a:p>
-            <a:pPr algn="l"/>
-            <a:r>
-              <a:rPr lang="pt-BR" sz="2500" dirty="0">
+              <a:t>Indianara</a:t>
+            </a:r>
+            <a:r>
+              <a:rPr lang="pt-BR" sz="2400" dirty="0">
                 <a:solidFill>
-                  <a:srgbClr val="000000"/>
+                  <a:schemeClr val="bg1"/>
                 </a:solidFill>
-                <a:effectLst/>
-                <a:latin typeface="+mj-lt"/>
+                <a:ea typeface="Calibri" panose="020F0502020204030204" pitchFamily="34" charset="0"/>
+              </a:rPr>
+              <a:t> Aparecida Costa Pinheiro </a:t>
+            </a:r>
+          </a:p>
+          <a:p>
+            <a:pPr marL="0" indent="0" algn="r">
+              <a:buNone/>
+            </a:pPr>
+            <a:r>
+              <a:rPr lang="pt-BR" sz="2400" dirty="0">
+                <a:solidFill>
+                  <a:schemeClr val="bg1"/>
+                </a:solidFill>
                 <a:ea typeface="Calibri" panose="020F0502020204030204" pitchFamily="34" charset="0"/>
               </a:rPr>
               <a:t>Kevin de Faria Tavares Bastos</a:t>
             </a:r>
-            <a:endParaRPr lang="pt-BR" sz="2500" dirty="0">
-              <a:solidFill>
-                <a:srgbClr val="000000"/>
-              </a:solidFill>
-              <a:latin typeface="+mj-lt"/>
-              <a:ea typeface="Calibri" panose="020F0502020204030204" pitchFamily="34" charset="0"/>
-            </a:endParaRPr>
-          </a:p>
-          <a:p>
-            <a:pPr algn="l"/>
-            <a:r>
-              <a:rPr lang="pt-BR" sz="2500" dirty="0">
+          </a:p>
+          <a:p>
+            <a:pPr marL="0" indent="0" algn="r">
+              <a:buNone/>
+            </a:pPr>
+            <a:r>
+              <a:rPr lang="pt-BR" sz="2400" dirty="0">
                 <a:solidFill>
-                  <a:srgbClr val="000000"/>
+                  <a:schemeClr val="bg1"/>
                 </a:solidFill>
-                <a:effectLst/>
-                <a:latin typeface="+mj-lt"/>
                 <a:ea typeface="Calibri" panose="020F0502020204030204" pitchFamily="34" charset="0"/>
               </a:rPr>
               <a:t>Leonardo Rogério Pazzini Silva Santos</a:t>
             </a:r>
           </a:p>
           <a:p>
-            <a:pPr algn="l"/>
-            <a:r>
-              <a:rPr lang="pt-BR" sz="2500" dirty="0">
+            <a:pPr marL="0" indent="0" algn="r">
+              <a:buNone/>
+            </a:pPr>
+            <a:r>
+              <a:rPr lang="pt-BR" sz="2400" dirty="0">
                 <a:solidFill>
-                  <a:srgbClr val="000000"/>
+                  <a:schemeClr val="bg1"/>
                 </a:solidFill>
-                <a:effectLst/>
-                <a:latin typeface="+mj-lt"/>
                 <a:ea typeface="Calibri" panose="020F0502020204030204" pitchFamily="34" charset="0"/>
               </a:rPr>
               <a:t>Luiz Augusto Rodrigo Vieira da Fonseca</a:t>
             </a:r>
           </a:p>
           <a:p>
-            <a:pPr algn="l"/>
-            <a:r>
-              <a:rPr lang="pt-BR" sz="2500" dirty="0">
+            <a:pPr marL="0" indent="0" algn="r">
+              <a:buNone/>
+            </a:pPr>
+            <a:r>
+              <a:rPr lang="pt-BR" sz="2400" dirty="0">
                 <a:solidFill>
-                  <a:srgbClr val="000000"/>
+                  <a:schemeClr val="bg1"/>
                 </a:solidFill>
-                <a:effectLst/>
-                <a:latin typeface="+mj-lt"/>
                 <a:ea typeface="Calibri" panose="020F0502020204030204" pitchFamily="34" charset="0"/>
               </a:rPr>
-              <a:t>Nicolas Pereira de Araujo</a:t>
-            </a:r>
+              <a:t>Nicolas Pereira de </a:t>
+            </a:r>
+            <a:r>
+              <a:rPr lang="pt-BR" sz="2400" dirty="0" err="1">
+                <a:solidFill>
+                  <a:schemeClr val="bg1"/>
+                </a:solidFill>
+                <a:ea typeface="Calibri" panose="020F0502020204030204" pitchFamily="34" charset="0"/>
+              </a:rPr>
+              <a:t>Araujo</a:t>
+            </a:r>
+            <a:endParaRPr lang="pt-BR" sz="2000" dirty="0">
+              <a:solidFill>
+                <a:schemeClr val="bg1"/>
+              </a:solidFill>
+              <a:ea typeface="Calibri" panose="020F0502020204030204" pitchFamily="34" charset="0"/>
+            </a:endParaRPr>
           </a:p>
         </p:txBody>
       </p:sp>
       <p:pic>
         <p:nvPicPr>
-          <p:cNvPr id="5" name="Picture 4" descr="PROJETO E FABRICAÇÃO DE UMA TORRE PARA ENSAIOS AERODINÂMICOS: UMA  ALTERNATIVA AO TÚNEL DE VENTO">
-            <a:extLst>
-              <a:ext uri="{FF2B5EF4-FFF2-40B4-BE49-F238E27FC236}">
-                <a16:creationId xmlns:a16="http://schemas.microsoft.com/office/drawing/2014/main" id="{63995422-D37D-4570-9C15-96DC599D5B45}"/>
+          <p:cNvPr id="10" name="Picture 4" descr="PROJETO E FABRICAÇÃO DE UMA TORRE PARA ENSAIOS AERODINÂMICOS: UMA  ALTERNATIVA AO TÚNEL DE VENTO">
+            <a:extLst>
+              <a:ext uri="{FF2B5EF4-FFF2-40B4-BE49-F238E27FC236}">
+                <a16:creationId xmlns:a16="http://schemas.microsoft.com/office/drawing/2014/main" id="{B1B162B4-FC23-4675-B8E9-0DE06B989547}"/>
               </a:ext>
             </a:extLst>
           </p:cNvPr>
@@ -3548,7 +4161,23 @@
         </p:nvPicPr>
         <p:blipFill>
           <a:blip r:embed="rId3">
-            <a:extLst>
+            <a:alphaModFix amt="86000"/>
+            <a:extLst>
+              <a:ext uri="{BEBA8EAE-BF5A-486C-A8C5-ECC9F3942E4B}">
+                <a14:imgProps xmlns:a14="http://schemas.microsoft.com/office/drawing/2010/main">
+                  <a14:imgLayer r:embed="rId4">
+                    <a14:imgEffect>
+                      <a14:sharpenSoften amount="17000"/>
+                    </a14:imgEffect>
+                    <a14:imgEffect>
+                      <a14:colorTemperature colorTemp="6300"/>
+                    </a14:imgEffect>
+                    <a14:imgEffect>
+                      <a14:brightnessContrast bright="-3000" contrast="7000"/>
+                    </a14:imgEffect>
+                  </a14:imgLayer>
+                </a14:imgProps>
+              </a:ext>
               <a:ext uri="{28A0092B-C50C-407E-A947-70E740481C1C}">
                 <a14:useLocalDpi xmlns:a14="http://schemas.microsoft.com/office/drawing/2010/main" val="0"/>
               </a:ext>
@@ -3561,28 +4190,22 @@
         </p:blipFill>
         <p:spPr bwMode="auto">
           <a:xfrm>
-            <a:off x="0" y="51413"/>
-            <a:ext cx="5188110" cy="1097280"/>
+            <a:off x="6934540" y="-399"/>
+            <a:ext cx="5257460" cy="1056912"/>
           </a:xfrm>
           <a:prstGeom prst="rect">
             <a:avLst/>
           </a:prstGeom>
           <a:noFill/>
-          <a:extLst>
-            <a:ext uri="{909E8E84-426E-40DD-AFC4-6F175D3DCCD1}">
-              <a14:hiddenFill xmlns:a14="http://schemas.microsoft.com/office/drawing/2010/main">
-                <a:solidFill>
-                  <a:srgbClr val="FFFFFF"/>
-                </a:solidFill>
-              </a14:hiddenFill>
-            </a:ext>
-          </a:extLst>
+          <a:effectLst>
+            <a:softEdge rad="38100"/>
+          </a:effectLst>
         </p:spPr>
       </p:pic>
     </p:spTree>
     <p:extLst>
       <p:ext uri="{BB962C8B-B14F-4D97-AF65-F5344CB8AC3E}">
-        <p14:creationId xmlns:p14="http://schemas.microsoft.com/office/powerpoint/2010/main" val="3699095983"/>
+        <p14:creationId xmlns:p14="http://schemas.microsoft.com/office/powerpoint/2010/main" val="24787359"/>
       </p:ext>
     </p:extLst>
   </p:cSld>
@@ -3644,7 +4267,7 @@
                 <a:ea typeface="Calibri" panose="020F0502020204030204" pitchFamily="34" charset="0"/>
                 <a:cs typeface="Arial" panose="020B0604020202020204" pitchFamily="34" charset="0"/>
               </a:rPr>
-              <a:t>O que é planejamento da manutenção e a sua importância?</a:t>
+              <a:t> </a:t>
             </a:r>
             <a:endParaRPr lang="pt-BR" sz="4000" dirty="0">
               <a:effectLst/>
@@ -3715,8 +4338,8 @@
         </p:blipFill>
         <p:spPr bwMode="auto">
           <a:xfrm>
-            <a:off x="7503015" y="2370569"/>
-            <a:ext cx="4092637" cy="2508257"/>
+            <a:off x="6228523" y="1934994"/>
+            <a:ext cx="5164270" cy="3165030"/>
           </a:xfrm>
           <a:prstGeom prst="rect">
             <a:avLst/>
@@ -3747,8 +4370,8 @@
         </p:nvSpPr>
         <p:spPr>
           <a:xfrm>
-            <a:off x="834887" y="2370569"/>
-            <a:ext cx="7129670" cy="2028889"/>
+            <a:off x="464335" y="1605414"/>
+            <a:ext cx="7129670" cy="4420890"/>
           </a:xfrm>
           <a:prstGeom prst="rect">
             <a:avLst/>
@@ -3769,12 +4392,12 @@
               <a:buChar char="Ø"/>
             </a:pPr>
             <a:r>
-              <a:rPr lang="pt-BR" sz="2200" b="1" dirty="0">
+              <a:rPr lang="pt-BR" sz="2400" b="1" dirty="0">
                 <a:effectLst/>
                 <a:latin typeface="+mj-lt"/>
                 <a:ea typeface="Calibri" panose="020F0502020204030204" pitchFamily="34" charset="0"/>
               </a:rPr>
-              <a:t>Equipe de controle de configuração</a:t>
+              <a:t>A entrevista</a:t>
             </a:r>
           </a:p>
           <a:p>
@@ -3786,12 +4409,11 @@
               <a:buChar char="Ø"/>
             </a:pPr>
             <a:r>
-              <a:rPr lang="pt-BR" sz="2200" b="1" dirty="0">
-                <a:effectLst/>
+              <a:rPr lang="pt-BR" sz="2400" b="1" dirty="0">
                 <a:latin typeface="+mj-lt"/>
                 <a:ea typeface="Calibri" panose="020F0502020204030204" pitchFamily="34" charset="0"/>
               </a:rPr>
-              <a:t>MEL – Lista de Equipamentos Mínimos</a:t>
+              <a:t>Planejamento x Programa de manutenção</a:t>
             </a:r>
           </a:p>
           <a:p>
@@ -3803,13 +4425,138 @@
               <a:buChar char="Ø"/>
             </a:pPr>
             <a:r>
-              <a:rPr lang="pt-BR" sz="2200" b="1" dirty="0">
+              <a:rPr lang="pt-BR" sz="2400" b="1" dirty="0">
+                <a:latin typeface="+mj-lt"/>
+                <a:ea typeface="Calibri" panose="020F0502020204030204" pitchFamily="34" charset="0"/>
+              </a:rPr>
+              <a:t>Carteira de registros</a:t>
+            </a:r>
+          </a:p>
+          <a:p>
+            <a:pPr marL="342900" indent="-342900">
+              <a:lnSpc>
+                <a:spcPct val="200000"/>
+              </a:lnSpc>
+              <a:buFont typeface="Wingdings" panose="05000000000000000000" pitchFamily="2" charset="2"/>
+              <a:buChar char="Ø"/>
+            </a:pPr>
+            <a:r>
+              <a:rPr lang="pt-BR" sz="2400" b="1" dirty="0">
+                <a:latin typeface="+mj-lt"/>
+                <a:ea typeface="Calibri" panose="020F0502020204030204" pitchFamily="34" charset="0"/>
+              </a:rPr>
+              <a:t>Divisão  das equipes de Planejamento</a:t>
+            </a:r>
+          </a:p>
+          <a:p>
+            <a:pPr marL="342900" indent="-342900">
+              <a:lnSpc>
+                <a:spcPct val="200000"/>
+              </a:lnSpc>
+              <a:buFont typeface="Wingdings" panose="05000000000000000000" pitchFamily="2" charset="2"/>
+              <a:buChar char="Ø"/>
+            </a:pPr>
+            <a:endParaRPr lang="pt-BR" sz="2400" b="1" dirty="0">
+              <a:latin typeface="+mj-lt"/>
+              <a:ea typeface="Calibri" panose="020F0502020204030204" pitchFamily="34" charset="0"/>
+            </a:endParaRPr>
+          </a:p>
+          <a:p>
+            <a:pPr>
+              <a:lnSpc>
+                <a:spcPct val="200000"/>
+              </a:lnSpc>
+            </a:pPr>
+            <a:endParaRPr lang="pt-BR" sz="2400" b="1" dirty="0">
+              <a:latin typeface="+mj-lt"/>
+              <a:ea typeface="Calibri" panose="020F0502020204030204" pitchFamily="34" charset="0"/>
+            </a:endParaRPr>
+          </a:p>
+        </p:txBody>
+      </p:sp>
+      <p:sp>
+        <p:nvSpPr>
+          <p:cNvPr id="4" name="CaixaDeTexto 3">
+            <a:extLst>
+              <a:ext uri="{FF2B5EF4-FFF2-40B4-BE49-F238E27FC236}">
+                <a16:creationId xmlns:a16="http://schemas.microsoft.com/office/drawing/2014/main" id="{8E28D7F0-E702-4B7B-95F1-1B533E305890}"/>
+              </a:ext>
+            </a:extLst>
+          </p:cNvPr>
+          <p:cNvSpPr txBox="1"/>
+          <p:nvPr/>
+        </p:nvSpPr>
+        <p:spPr>
+          <a:xfrm>
+            <a:off x="931730" y="4482037"/>
+            <a:ext cx="5164270" cy="1823576"/>
+          </a:xfrm>
+          <a:prstGeom prst="rect">
+            <a:avLst/>
+          </a:prstGeom>
+          <a:noFill/>
+        </p:spPr>
+        <p:txBody>
+          <a:bodyPr wrap="square" rtlCol="0">
+            <a:spAutoFit/>
+          </a:bodyPr>
+          <a:lstStyle/>
+          <a:p>
+            <a:pPr marL="342900" indent="-342900">
+              <a:lnSpc>
+                <a:spcPct val="150000"/>
+              </a:lnSpc>
+              <a:buFont typeface="Arial" panose="020B0604020202020204" pitchFamily="34" charset="0"/>
+              <a:buChar char="•"/>
+            </a:pPr>
+            <a:r>
+              <a:rPr lang="pt-BR" sz="2100" b="1" dirty="0">
+                <a:latin typeface="+mj-lt"/>
+                <a:ea typeface="Calibri" panose="020F0502020204030204" pitchFamily="34" charset="0"/>
+              </a:rPr>
+              <a:t>Controle e Configuração</a:t>
+            </a:r>
+          </a:p>
+          <a:p>
+            <a:pPr marL="342900" indent="-342900">
+              <a:lnSpc>
+                <a:spcPct val="150000"/>
+              </a:lnSpc>
+              <a:buFont typeface="Arial" panose="020B0604020202020204" pitchFamily="34" charset="0"/>
+              <a:buChar char="•"/>
+            </a:pPr>
+            <a:r>
+              <a:rPr lang="pt-BR" sz="2100" b="1" dirty="0">
                 <a:effectLst/>
                 <a:latin typeface="+mj-lt"/>
                 <a:ea typeface="Calibri" panose="020F0502020204030204" pitchFamily="34" charset="0"/>
               </a:rPr>
-              <a:t>Equipe de gerenciamento do programa de manutenção</a:t>
-            </a:r>
+              <a:t>MEL</a:t>
+            </a:r>
+          </a:p>
+          <a:p>
+            <a:pPr marL="342900" indent="-342900">
+              <a:lnSpc>
+                <a:spcPct val="150000"/>
+              </a:lnSpc>
+              <a:buFont typeface="Arial" panose="020B0604020202020204" pitchFamily="34" charset="0"/>
+              <a:buChar char="•"/>
+            </a:pPr>
+            <a:r>
+              <a:rPr lang="pt-BR" sz="2100" b="1" dirty="0">
+                <a:latin typeface="+mj-lt"/>
+                <a:ea typeface="Calibri" panose="020F0502020204030204" pitchFamily="34" charset="0"/>
+              </a:rPr>
+              <a:t>Ger. do Programa de Manutenção</a:t>
+            </a:r>
+            <a:endParaRPr lang="pt-BR" sz="2100" b="1" dirty="0">
+              <a:effectLst/>
+              <a:latin typeface="+mj-lt"/>
+              <a:ea typeface="Calibri" panose="020F0502020204030204" pitchFamily="34" charset="0"/>
+            </a:endParaRPr>
+          </a:p>
+          <a:p>
+            <a:endParaRPr lang="pt-BR" dirty="0"/>
           </a:p>
         </p:txBody>
       </p:sp>
@@ -3870,7 +4617,7 @@
         </p:blipFill>
         <p:spPr bwMode="auto">
           <a:xfrm>
-            <a:off x="6838121" y="2317709"/>
+            <a:off x="6262977" y="1442664"/>
             <a:ext cx="4664765" cy="3139819"/>
           </a:xfrm>
           <a:prstGeom prst="rect">
@@ -3890,24 +4637,65 @@
       </p:pic>
       <p:sp>
         <p:nvSpPr>
-          <p:cNvPr id="13" name="Subtítulo 2">
-            <a:extLst>
-              <a:ext uri="{FF2B5EF4-FFF2-40B4-BE49-F238E27FC236}">
-                <a16:creationId xmlns:a16="http://schemas.microsoft.com/office/drawing/2014/main" id="{9E5243C3-E449-4D25-8612-6269293C51DD}"/>
-              </a:ext>
-            </a:extLst>
-          </p:cNvPr>
-          <p:cNvSpPr>
-            <a:spLocks noGrp="1"/>
-          </p:cNvSpPr>
-          <p:nvPr>
-            <p:ph type="subTitle" idx="1"/>
+          <p:cNvPr id="5" name="Título 1">
+            <a:extLst>
+              <a:ext uri="{FF2B5EF4-FFF2-40B4-BE49-F238E27FC236}">
+                <a16:creationId xmlns:a16="http://schemas.microsoft.com/office/drawing/2014/main" id="{5CAB08D9-9835-4A56-933B-6E4669C15ACC}"/>
+              </a:ext>
+            </a:extLst>
+          </p:cNvPr>
+          <p:cNvSpPr>
+            <a:spLocks noGrp="1"/>
+          </p:cNvSpPr>
+          <p:nvPr>
+            <p:ph type="ctrTitle"/>
           </p:nvPr>
         </p:nvSpPr>
         <p:spPr>
           <a:xfrm>
-            <a:off x="834887" y="2567134"/>
-            <a:ext cx="6983895" cy="2640970"/>
+            <a:off x="3220277" y="704376"/>
+            <a:ext cx="6493565" cy="999711"/>
+          </a:xfrm>
+        </p:spPr>
+        <p:txBody>
+          <a:bodyPr>
+            <a:normAutofit/>
+          </a:bodyPr>
+          <a:lstStyle/>
+          <a:p>
+            <a:r>
+              <a:rPr lang="pt-BR" sz="4000" b="1" u="sng" dirty="0">
+                <a:effectLst/>
+                <a:latin typeface="Calibri Light" panose="020F0302020204030204" pitchFamily="34" charset="0"/>
+                <a:ea typeface="Calibri" panose="020F0502020204030204" pitchFamily="34" charset="0"/>
+                <a:cs typeface="Arial" panose="020B0604020202020204" pitchFamily="34" charset="0"/>
+              </a:rPr>
+              <a:t> </a:t>
+            </a:r>
+            <a:endParaRPr lang="pt-BR" sz="4000" dirty="0"/>
+          </a:p>
+        </p:txBody>
+      </p:sp>
+      <p:sp>
+        <p:nvSpPr>
+          <p:cNvPr id="13" name="Subtítulo 2">
+            <a:extLst>
+              <a:ext uri="{FF2B5EF4-FFF2-40B4-BE49-F238E27FC236}">
+                <a16:creationId xmlns:a16="http://schemas.microsoft.com/office/drawing/2014/main" id="{9E5243C3-E449-4D25-8612-6269293C51DD}"/>
+              </a:ext>
+            </a:extLst>
+          </p:cNvPr>
+          <p:cNvSpPr>
+            <a:spLocks noGrp="1"/>
+          </p:cNvSpPr>
+          <p:nvPr>
+            <p:ph type="subTitle" idx="1"/>
+          </p:nvPr>
+        </p:nvSpPr>
+        <p:spPr>
+          <a:xfrm>
+            <a:off x="834887" y="1204231"/>
+            <a:ext cx="6983895" cy="4820005"/>
           </a:xfrm>
         </p:spPr>
         <p:txBody>
@@ -3916,7 +4704,7 @@
           </a:bodyPr>
           <a:lstStyle/>
           <a:p>
-            <a:pPr marL="457200" indent="-457200" algn="l">
+            <a:pPr marL="342900" indent="-342900" algn="l">
               <a:lnSpc>
                 <a:spcPct val="150000"/>
               </a:lnSpc>
@@ -3924,20 +4712,170 @@
               <a:buChar char="Ø"/>
             </a:pPr>
             <a:r>
-              <a:rPr lang="pt-BR" sz="2300" b="1" dirty="0">
+              <a:rPr lang="pt-BR" sz="2800" b="1" dirty="0">
+                <a:effectLst/>
+                <a:latin typeface="+mj-lt"/>
+                <a:ea typeface="Calibri" panose="020F0502020204030204" pitchFamily="34" charset="0"/>
+                <a:cs typeface="Arial" panose="020B0604020202020204" pitchFamily="34" charset="0"/>
+              </a:rPr>
+              <a:t>Atividades do Planejamento</a:t>
+            </a:r>
+            <a:endParaRPr lang="pt-BR" sz="2800" b="1" dirty="0">
+              <a:effectLst/>
+              <a:latin typeface="+mj-lt"/>
+              <a:ea typeface="Calibri" panose="020F0502020204030204" pitchFamily="34" charset="0"/>
+            </a:endParaRPr>
+          </a:p>
+          <a:p>
+            <a:pPr marL="457200" indent="-457200" algn="l">
+              <a:lnSpc>
+                <a:spcPct val="100000"/>
+              </a:lnSpc>
+              <a:buFont typeface="Arial" panose="020B0604020202020204" pitchFamily="34" charset="0"/>
+              <a:buChar char="•"/>
+            </a:pPr>
+            <a:r>
+              <a:rPr lang="pt-BR" sz="2100" b="1" dirty="0">
                 <a:effectLst/>
                 <a:latin typeface="+mj-lt"/>
                 <a:ea typeface="Calibri" panose="020F0502020204030204" pitchFamily="34" charset="0"/>
               </a:rPr>
               <a:t>Planejamento de manutenção de linha</a:t>
             </a:r>
-            <a:endParaRPr lang="pt-BR" sz="2300" b="1" dirty="0">
+            <a:endParaRPr lang="pt-BR" sz="2100" b="1" dirty="0">
               <a:latin typeface="+mj-lt"/>
               <a:ea typeface="Calibri" panose="020F0502020204030204" pitchFamily="34" charset="0"/>
             </a:endParaRPr>
           </a:p>
           <a:p>
             <a:pPr marL="457200" indent="-457200" algn="l">
+              <a:lnSpc>
+                <a:spcPct val="100000"/>
+              </a:lnSpc>
+              <a:buFont typeface="Arial" panose="020B0604020202020204" pitchFamily="34" charset="0"/>
+              <a:buChar char="•"/>
+            </a:pPr>
+            <a:r>
+              <a:rPr lang="pt-BR" sz="2100" b="1" dirty="0">
+                <a:effectLst/>
+                <a:latin typeface="+mj-lt"/>
+                <a:ea typeface="Calibri" panose="020F0502020204030204" pitchFamily="34" charset="0"/>
+              </a:rPr>
+              <a:t>Planejamento de manutenção em bloco</a:t>
+            </a:r>
+          </a:p>
+          <a:p>
+            <a:pPr marL="457200" indent="-457200" algn="l">
+              <a:lnSpc>
+                <a:spcPct val="100000"/>
+              </a:lnSpc>
+              <a:buFont typeface="Arial" panose="020B0604020202020204" pitchFamily="34" charset="0"/>
+              <a:buChar char="•"/>
+            </a:pPr>
+            <a:r>
+              <a:rPr lang="pt-BR" sz="2100" b="1" dirty="0">
+                <a:effectLst/>
+                <a:latin typeface="+mj-lt"/>
+                <a:ea typeface="Calibri" panose="020F0502020204030204" pitchFamily="34" charset="0"/>
+              </a:rPr>
+              <a:t>Planejamento heavy </a:t>
+            </a:r>
+            <a:r>
+              <a:rPr lang="pt-BR" sz="2100" b="1" dirty="0">
+                <a:solidFill>
+                  <a:srgbClr val="000000"/>
+                </a:solidFill>
+                <a:effectLst/>
+                <a:latin typeface="+mj-lt"/>
+                <a:ea typeface="Calibri" panose="020F0502020204030204" pitchFamily="34" charset="0"/>
+              </a:rPr>
+              <a:t>Maintenance </a:t>
+            </a:r>
+            <a:endParaRPr lang="pt-BR" sz="2100" b="1" dirty="0">
+              <a:solidFill>
+                <a:srgbClr val="000000"/>
+              </a:solidFill>
+              <a:latin typeface="+mj-lt"/>
+              <a:ea typeface="Calibri" panose="020F0502020204030204" pitchFamily="34" charset="0"/>
+            </a:endParaRPr>
+          </a:p>
+          <a:p>
+            <a:pPr marL="457200" indent="-457200" algn="l">
+              <a:lnSpc>
+                <a:spcPct val="100000"/>
+              </a:lnSpc>
+              <a:buFont typeface="Arial" panose="020B0604020202020204" pitchFamily="34" charset="0"/>
+              <a:buChar char="•"/>
+            </a:pPr>
+            <a:r>
+              <a:rPr lang="pt-BR" sz="2100" b="1" dirty="0">
+                <a:solidFill>
+                  <a:srgbClr val="000000"/>
+                </a:solidFill>
+                <a:effectLst/>
+                <a:latin typeface="+mj-lt"/>
+                <a:ea typeface="Calibri" panose="020F0502020204030204" pitchFamily="34" charset="0"/>
+              </a:rPr>
+              <a:t>Célula de projetos especiais/estratégico</a:t>
+            </a:r>
+          </a:p>
+          <a:p>
+            <a:pPr marL="457200" indent="-457200" algn="l">
+              <a:lnSpc>
+                <a:spcPct val="100000"/>
+              </a:lnSpc>
+              <a:buFont typeface="Arial" panose="020B0604020202020204" pitchFamily="34" charset="0"/>
+              <a:buChar char="•"/>
+            </a:pPr>
+            <a:endParaRPr lang="pt-BR" sz="2100" b="1" dirty="0">
+              <a:solidFill>
+                <a:srgbClr val="000000"/>
+              </a:solidFill>
+              <a:effectLst/>
+              <a:latin typeface="+mj-lt"/>
+              <a:ea typeface="Calibri" panose="020F0502020204030204" pitchFamily="34" charset="0"/>
+            </a:endParaRPr>
+          </a:p>
+          <a:p>
+            <a:pPr algn="l">
+              <a:lnSpc>
+                <a:spcPct val="100000"/>
+              </a:lnSpc>
+            </a:pPr>
+            <a:endParaRPr lang="pt-BR" sz="2100" b="1" dirty="0">
+              <a:solidFill>
+                <a:srgbClr val="000000"/>
+              </a:solidFill>
+              <a:effectLst/>
+              <a:latin typeface="+mj-lt"/>
+              <a:ea typeface="Calibri" panose="020F0502020204030204" pitchFamily="34" charset="0"/>
+              <a:cs typeface="Arial" panose="020B0604020202020204" pitchFamily="34" charset="0"/>
+            </a:endParaRPr>
+          </a:p>
+          <a:p>
+            <a:pPr marL="342900" indent="-342900" algn="l">
+              <a:lnSpc>
+                <a:spcPct val="100000"/>
+              </a:lnSpc>
+              <a:buFont typeface="Wingdings" panose="05000000000000000000" pitchFamily="2" charset="2"/>
+              <a:buChar char="Ø"/>
+            </a:pPr>
+            <a:r>
+              <a:rPr lang="pt-BR" sz="2400" b="1" dirty="0">
+                <a:effectLst/>
+                <a:latin typeface="+mj-lt"/>
+                <a:ea typeface="Calibri" panose="020F0502020204030204" pitchFamily="34" charset="0"/>
+                <a:cs typeface="Arial" panose="020B0604020202020204" pitchFamily="34" charset="0"/>
+              </a:rPr>
+              <a:t>A importância do planejamento de Manutenção</a:t>
+            </a:r>
+            <a:endParaRPr lang="pt-BR" sz="2400" b="1" dirty="0">
+              <a:latin typeface="+mj-lt"/>
+              <a:ea typeface="Calibri" panose="020F0502020204030204" pitchFamily="34" charset="0"/>
+            </a:endParaRPr>
+          </a:p>
+          <a:p>
+            <a:pPr marL="342900" indent="-342900" algn="l">
               <a:lnSpc>
                 <a:spcPct val="150000"/>
               </a:lnSpc>
@@ -3945,16 +4883,18 @@
               <a:buChar char="Ø"/>
             </a:pPr>
             <a:r>
-              <a:rPr lang="pt-BR" sz="2300" b="1" dirty="0">
-                <a:effectLst/>
+              <a:rPr lang="pt-BR" b="1" dirty="0">
+                <a:solidFill>
+                  <a:srgbClr val="000000"/>
+                </a:solidFill>
                 <a:latin typeface="+mj-lt"/>
                 <a:ea typeface="Calibri" panose="020F0502020204030204" pitchFamily="34" charset="0"/>
               </a:rPr>
-              <a:t>Planejamento de manutenção em bloco</a:t>
-            </a:r>
-          </a:p>
-          <a:p>
-            <a:pPr marL="457200" indent="-457200" algn="l">
+              <a:t>Agendamento do Heavy Checkup</a:t>
+            </a:r>
+          </a:p>
+          <a:p>
+            <a:pPr marL="342900" indent="-342900" algn="l">
               <a:lnSpc>
                 <a:spcPct val="150000"/>
               </a:lnSpc>
@@ -3962,13 +4902,22 @@
               <a:buChar char="Ø"/>
             </a:pPr>
             <a:r>
-              <a:rPr lang="pt-BR" sz="2300" b="1" dirty="0">
-                <a:effectLst/>
+              <a:rPr lang="pt-BR" b="1" dirty="0">
+                <a:solidFill>
+                  <a:srgbClr val="000000"/>
+                </a:solidFill>
                 <a:latin typeface="+mj-lt"/>
                 <a:ea typeface="Calibri" panose="020F0502020204030204" pitchFamily="34" charset="0"/>
               </a:rPr>
-              <a:t>Planejamento heavy </a:t>
-            </a:r>
+              <a:t>CTM – Controle Técnico de Manutenção</a:t>
+            </a:r>
+          </a:p>
+          <a:p>
+            <a:pPr algn="l">
+              <a:lnSpc>
+                <a:spcPct val="150000"/>
+              </a:lnSpc>
+            </a:pPr>
             <a:r>
               <a:rPr lang="pt-BR" sz="2300" b="1" dirty="0">
                 <a:solidFill>
@@ -3978,34 +4927,7 @@
                 <a:latin typeface="+mj-lt"/>
                 <a:ea typeface="Calibri" panose="020F0502020204030204" pitchFamily="34" charset="0"/>
               </a:rPr>
-              <a:t>Maintenance </a:t>
-            </a:r>
-            <a:endParaRPr lang="pt-BR" sz="2300" b="1" dirty="0">
-              <a:solidFill>
-                <a:srgbClr val="000000"/>
-              </a:solidFill>
-              <a:latin typeface="+mj-lt"/>
-              <a:ea typeface="Calibri" panose="020F0502020204030204" pitchFamily="34" charset="0"/>
-            </a:endParaRPr>
-          </a:p>
-          <a:p>
-            <a:pPr marL="457200" indent="-457200" algn="l">
-              <a:lnSpc>
-                <a:spcPct val="150000"/>
-              </a:lnSpc>
-              <a:buFont typeface="Wingdings" panose="05000000000000000000" pitchFamily="2" charset="2"/>
-              <a:buChar char="Ø"/>
-            </a:pPr>
-            <a:r>
-              <a:rPr lang="pt-BR" sz="2300" b="1" dirty="0">
-                <a:solidFill>
-                  <a:srgbClr val="000000"/>
-                </a:solidFill>
-                <a:effectLst/>
-                <a:latin typeface="+mj-lt"/>
-                <a:ea typeface="Calibri" panose="020F0502020204030204" pitchFamily="34" charset="0"/>
-              </a:rPr>
-              <a:t>Célula de projetos especiais/estratégico </a:t>
+              <a:t> </a:t>
             </a:r>
             <a:endParaRPr lang="pt-BR" sz="2300" b="1" dirty="0">
               <a:effectLst/>
@@ -4048,47 +4970,6 @@
           </a:effectLst>
         </p:spPr>
       </p:pic>
-      <p:sp>
-        <p:nvSpPr>
-          <p:cNvPr id="5" name="Título 1">
-            <a:extLst>
-              <a:ext uri="{FF2B5EF4-FFF2-40B4-BE49-F238E27FC236}">
-                <a16:creationId xmlns:a16="http://schemas.microsoft.com/office/drawing/2014/main" id="{5CAB08D9-9835-4A56-933B-6E4669C15ACC}"/>
-              </a:ext>
-            </a:extLst>
-          </p:cNvPr>
-          <p:cNvSpPr>
-            <a:spLocks noGrp="1"/>
-          </p:cNvSpPr>
-          <p:nvPr>
-            <p:ph type="ctrTitle"/>
-          </p:nvPr>
-        </p:nvSpPr>
-        <p:spPr>
-          <a:xfrm>
-            <a:off x="3220277" y="875530"/>
-            <a:ext cx="6493565" cy="999711"/>
-          </a:xfrm>
-        </p:spPr>
-        <p:txBody>
-          <a:bodyPr>
-            <a:normAutofit/>
-          </a:bodyPr>
-          <a:lstStyle/>
-          <a:p>
-            <a:r>
-              <a:rPr lang="pt-BR" sz="4000" b="1" u="sng" dirty="0">
-                <a:effectLst/>
-                <a:latin typeface="Calibri Light" panose="020F0302020204030204" pitchFamily="34" charset="0"/>
-                <a:ea typeface="Calibri" panose="020F0502020204030204" pitchFamily="34" charset="0"/>
-                <a:cs typeface="Arial" panose="020B0604020202020204" pitchFamily="34" charset="0"/>
-              </a:rPr>
-              <a:t>Atividades do Planejamento</a:t>
-            </a:r>
-            <a:endParaRPr lang="pt-BR" sz="4000" dirty="0"/>
-          </a:p>
-        </p:txBody>
-      </p:sp>
     </p:spTree>
     <p:extLst>
       <p:ext uri="{BB962C8B-B14F-4D97-AF65-F5344CB8AC3E}">
@@ -4148,8 +5029,8 @@
         </p:blipFill>
         <p:spPr bwMode="auto">
           <a:xfrm>
-            <a:off x="4721481" y="1090465"/>
-            <a:ext cx="7868084" cy="5245390"/>
+            <a:off x="4015409" y="619750"/>
+            <a:ext cx="8574156" cy="5716105"/>
           </a:xfrm>
           <a:prstGeom prst="rect">
             <a:avLst/>
@@ -4217,8 +5098,8 @@
         </p:nvSpPr>
         <p:spPr>
           <a:xfrm>
-            <a:off x="954157" y="2600739"/>
-            <a:ext cx="9144000" cy="1921566"/>
+            <a:off x="954157" y="2451651"/>
+            <a:ext cx="9144000" cy="3631095"/>
           </a:xfrm>
         </p:spPr>
         <p:txBody>
@@ -4235,13 +5116,13 @@
               <a:buChar char="Ø"/>
             </a:pPr>
             <a:r>
-              <a:rPr lang="pt-BR" sz="2300" b="1" dirty="0">
+              <a:rPr lang="pt-BR" b="1" dirty="0">
                 <a:effectLst/>
                 <a:latin typeface="Calibri Light" panose="020F0302020204030204" pitchFamily="34" charset="0"/>
                 <a:ea typeface="Calibri" panose="020F0502020204030204" pitchFamily="34" charset="0"/>
                 <a:cs typeface="Arial" panose="020B0604020202020204" pitchFamily="34" charset="0"/>
               </a:rPr>
-              <a:t>Ambiente de trabalho</a:t>
+              <a:t>Ambiente de trabalho Diversificado</a:t>
             </a:r>
           </a:p>
           <a:p>
@@ -4253,7 +5134,7 @@
               <a:buChar char="Ø"/>
             </a:pPr>
             <a:r>
-              <a:rPr lang="pt-BR" sz="2300" b="1" dirty="0">
+              <a:rPr lang="pt-BR" b="1" dirty="0">
                 <a:effectLst/>
                 <a:latin typeface="Calibri Light" panose="020F0302020204030204" pitchFamily="34" charset="0"/>
                 <a:ea typeface="Calibri" panose="020F0502020204030204" pitchFamily="34" charset="0"/>
@@ -4271,7 +5152,7 @@
               <a:buChar char="Ø"/>
             </a:pPr>
             <a:r>
-              <a:rPr lang="pt-BR" sz="2300" b="1" dirty="0">
+              <a:rPr lang="pt-BR" b="1" dirty="0">
                 <a:effectLst/>
                 <a:latin typeface="Calibri Light" panose="020F0302020204030204" pitchFamily="34" charset="0"/>
                 <a:ea typeface="Calibri" panose="020F0502020204030204" pitchFamily="34" charset="0"/>
@@ -4279,7 +5160,7 @@
               </a:rPr>
               <a:t>Serviços emergenciais</a:t>
             </a:r>
-            <a:endParaRPr lang="pt-BR" sz="2300" b="1" dirty="0">
+            <a:endParaRPr lang="pt-BR" b="1" dirty="0">
               <a:latin typeface="+mj-lt"/>
             </a:endParaRPr>
           </a:p>

</xml_diff>